<commit_message>
added more discussion of git
</commit_message>
<xml_diff>
--- a/software_version_control/lecture/2018_SoftwareVersionControl_Bruhwiler_USPAS.pptx
+++ b/software_version_control/lecture/2018_SoftwareVersionControl_Bruhwiler_USPAS.pptx
@@ -5,18 +5,22 @@
     <p:sldMasterId id="2147483696" r:id="rId1"/>
   </p:sldMasterIdLst>
   <p:notesMasterIdLst>
-    <p:notesMasterId r:id="rId11"/>
+    <p:notesMasterId r:id="rId15"/>
   </p:notesMasterIdLst>
   <p:sldIdLst>
     <p:sldId id="297" r:id="rId2"/>
     <p:sldId id="393" r:id="rId3"/>
     <p:sldId id="425" r:id="rId4"/>
     <p:sldId id="429" r:id="rId5"/>
-    <p:sldId id="426" r:id="rId6"/>
-    <p:sldId id="427" r:id="rId7"/>
-    <p:sldId id="428" r:id="rId8"/>
-    <p:sldId id="409" r:id="rId9"/>
-    <p:sldId id="424" r:id="rId10"/>
+    <p:sldId id="430" r:id="rId6"/>
+    <p:sldId id="431" r:id="rId7"/>
+    <p:sldId id="433" r:id="rId8"/>
+    <p:sldId id="432" r:id="rId9"/>
+    <p:sldId id="434" r:id="rId10"/>
+    <p:sldId id="426" r:id="rId11"/>
+    <p:sldId id="427" r:id="rId12"/>
+    <p:sldId id="409" r:id="rId13"/>
+    <p:sldId id="424" r:id="rId14"/>
   </p:sldIdLst>
   <p:sldSz cx="9144000" cy="6858000" type="screen4x3"/>
   <p:notesSz cx="6858000" cy="9144000"/>
@@ -223,7 +227,7 @@
           <a:p>
             <a:fld id="{C5D37280-896D-453C-A8B2-790CBDCE44E5}" type="datetimeFigureOut">
               <a:rPr lang="en-US" smtClean="0"/>
-              <a:t>1/13/2018</a:t>
+              <a:t>1/14/2018</a:t>
             </a:fld>
             <a:endParaRPr lang="en-US"/>
           </a:p>
@@ -583,6 +587,342 @@
 </p:notes>
 </file>
 
+<file path=ppt/notesSlides/notesSlide10.xml><?xml version="1.0" encoding="utf-8"?>
+<p:notes xmlns:a="http://schemas.openxmlformats.org/drawingml/2006/main" xmlns:r="http://schemas.openxmlformats.org/officeDocument/2006/relationships" xmlns:p="http://schemas.openxmlformats.org/presentationml/2006/main">
+  <p:cSld>
+    <p:spTree>
+      <p:nvGrpSpPr>
+        <p:cNvPr id="1" name=""/>
+        <p:cNvGrpSpPr/>
+        <p:nvPr/>
+      </p:nvGrpSpPr>
+      <p:grpSpPr>
+        <a:xfrm>
+          <a:off x="0" y="0"/>
+          <a:ext cx="0" cy="0"/>
+          <a:chOff x="0" y="0"/>
+          <a:chExt cx="0" cy="0"/>
+        </a:xfrm>
+      </p:grpSpPr>
+      <p:sp>
+        <p:nvSpPr>
+          <p:cNvPr id="2" name="Slide Image Placeholder 1"/>
+          <p:cNvSpPr>
+            <a:spLocks noGrp="1" noRot="1" noChangeAspect="1"/>
+          </p:cNvSpPr>
+          <p:nvPr>
+            <p:ph type="sldImg"/>
+          </p:nvPr>
+        </p:nvSpPr>
+        <p:spPr/>
+      </p:sp>
+      <p:sp>
+        <p:nvSpPr>
+          <p:cNvPr id="3" name="Notes Placeholder 2"/>
+          <p:cNvSpPr>
+            <a:spLocks noGrp="1"/>
+          </p:cNvSpPr>
+          <p:nvPr>
+            <p:ph type="body" idx="1"/>
+          </p:nvPr>
+        </p:nvSpPr>
+        <p:spPr/>
+        <p:txBody>
+          <a:bodyPr/>
+          <a:lstStyle/>
+          <a:p>
+            <a:endParaRPr lang="en-US"/>
+          </a:p>
+        </p:txBody>
+      </p:sp>
+      <p:sp>
+        <p:nvSpPr>
+          <p:cNvPr id="4" name="Slide Number Placeholder 3"/>
+          <p:cNvSpPr>
+            <a:spLocks noGrp="1"/>
+          </p:cNvSpPr>
+          <p:nvPr>
+            <p:ph type="sldNum" sz="quarter" idx="10"/>
+          </p:nvPr>
+        </p:nvSpPr>
+        <p:spPr/>
+        <p:txBody>
+          <a:bodyPr/>
+          <a:lstStyle/>
+          <a:p>
+            <a:fld id="{4E0E9D85-81CD-44C8-8F15-3AA06C34AF8C}" type="slidenum">
+              <a:rPr lang="en-US" smtClean="0"/>
+              <a:t>10</a:t>
+            </a:fld>
+            <a:endParaRPr lang="en-US"/>
+          </a:p>
+        </p:txBody>
+      </p:sp>
+    </p:spTree>
+    <p:extLst>
+      <p:ext uri="{BB962C8B-B14F-4D97-AF65-F5344CB8AC3E}">
+        <p14:creationId xmlns:p14="http://schemas.microsoft.com/office/powerpoint/2010/main" val="1394366699"/>
+      </p:ext>
+    </p:extLst>
+  </p:cSld>
+  <p:clrMapOvr>
+    <a:masterClrMapping/>
+  </p:clrMapOvr>
+</p:notes>
+</file>
+
+<file path=ppt/notesSlides/notesSlide11.xml><?xml version="1.0" encoding="utf-8"?>
+<p:notes xmlns:a="http://schemas.openxmlformats.org/drawingml/2006/main" xmlns:r="http://schemas.openxmlformats.org/officeDocument/2006/relationships" xmlns:p="http://schemas.openxmlformats.org/presentationml/2006/main">
+  <p:cSld>
+    <p:spTree>
+      <p:nvGrpSpPr>
+        <p:cNvPr id="1" name=""/>
+        <p:cNvGrpSpPr/>
+        <p:nvPr/>
+      </p:nvGrpSpPr>
+      <p:grpSpPr>
+        <a:xfrm>
+          <a:off x="0" y="0"/>
+          <a:ext cx="0" cy="0"/>
+          <a:chOff x="0" y="0"/>
+          <a:chExt cx="0" cy="0"/>
+        </a:xfrm>
+      </p:grpSpPr>
+      <p:sp>
+        <p:nvSpPr>
+          <p:cNvPr id="2" name="Slide Image Placeholder 1"/>
+          <p:cNvSpPr>
+            <a:spLocks noGrp="1" noRot="1" noChangeAspect="1"/>
+          </p:cNvSpPr>
+          <p:nvPr>
+            <p:ph type="sldImg"/>
+          </p:nvPr>
+        </p:nvSpPr>
+        <p:spPr/>
+      </p:sp>
+      <p:sp>
+        <p:nvSpPr>
+          <p:cNvPr id="3" name="Notes Placeholder 2"/>
+          <p:cNvSpPr>
+            <a:spLocks noGrp="1"/>
+          </p:cNvSpPr>
+          <p:nvPr>
+            <p:ph type="body" idx="1"/>
+          </p:nvPr>
+        </p:nvSpPr>
+        <p:spPr/>
+        <p:txBody>
+          <a:bodyPr/>
+          <a:lstStyle/>
+          <a:p>
+            <a:endParaRPr lang="en-US"/>
+          </a:p>
+        </p:txBody>
+      </p:sp>
+      <p:sp>
+        <p:nvSpPr>
+          <p:cNvPr id="4" name="Slide Number Placeholder 3"/>
+          <p:cNvSpPr>
+            <a:spLocks noGrp="1"/>
+          </p:cNvSpPr>
+          <p:nvPr>
+            <p:ph type="sldNum" sz="quarter" idx="10"/>
+          </p:nvPr>
+        </p:nvSpPr>
+        <p:spPr/>
+        <p:txBody>
+          <a:bodyPr/>
+          <a:lstStyle/>
+          <a:p>
+            <a:fld id="{4E0E9D85-81CD-44C8-8F15-3AA06C34AF8C}" type="slidenum">
+              <a:rPr lang="en-US" smtClean="0"/>
+              <a:t>11</a:t>
+            </a:fld>
+            <a:endParaRPr lang="en-US"/>
+          </a:p>
+        </p:txBody>
+      </p:sp>
+    </p:spTree>
+    <p:extLst>
+      <p:ext uri="{BB962C8B-B14F-4D97-AF65-F5344CB8AC3E}">
+        <p14:creationId xmlns:p14="http://schemas.microsoft.com/office/powerpoint/2010/main" val="1667884131"/>
+      </p:ext>
+    </p:extLst>
+  </p:cSld>
+  <p:clrMapOvr>
+    <a:masterClrMapping/>
+  </p:clrMapOvr>
+</p:notes>
+</file>
+
+<file path=ppt/notesSlides/notesSlide12.xml><?xml version="1.0" encoding="utf-8"?>
+<p:notes xmlns:a="http://schemas.openxmlformats.org/drawingml/2006/main" xmlns:r="http://schemas.openxmlformats.org/officeDocument/2006/relationships" xmlns:p="http://schemas.openxmlformats.org/presentationml/2006/main">
+  <p:cSld>
+    <p:spTree>
+      <p:nvGrpSpPr>
+        <p:cNvPr id="1" name=""/>
+        <p:cNvGrpSpPr/>
+        <p:nvPr/>
+      </p:nvGrpSpPr>
+      <p:grpSpPr>
+        <a:xfrm>
+          <a:off x="0" y="0"/>
+          <a:ext cx="0" cy="0"/>
+          <a:chOff x="0" y="0"/>
+          <a:chExt cx="0" cy="0"/>
+        </a:xfrm>
+      </p:grpSpPr>
+      <p:sp>
+        <p:nvSpPr>
+          <p:cNvPr id="2" name="Slide Image Placeholder 1"/>
+          <p:cNvSpPr>
+            <a:spLocks noGrp="1" noRot="1" noChangeAspect="1"/>
+          </p:cNvSpPr>
+          <p:nvPr>
+            <p:ph type="sldImg"/>
+          </p:nvPr>
+        </p:nvSpPr>
+        <p:spPr/>
+      </p:sp>
+      <p:sp>
+        <p:nvSpPr>
+          <p:cNvPr id="3" name="Notes Placeholder 2"/>
+          <p:cNvSpPr>
+            <a:spLocks noGrp="1"/>
+          </p:cNvSpPr>
+          <p:nvPr>
+            <p:ph type="body" idx="1"/>
+          </p:nvPr>
+        </p:nvSpPr>
+        <p:spPr/>
+        <p:txBody>
+          <a:bodyPr/>
+          <a:lstStyle/>
+          <a:p>
+            <a:endParaRPr lang="en-US"/>
+          </a:p>
+        </p:txBody>
+      </p:sp>
+      <p:sp>
+        <p:nvSpPr>
+          <p:cNvPr id="4" name="Slide Number Placeholder 3"/>
+          <p:cNvSpPr>
+            <a:spLocks noGrp="1"/>
+          </p:cNvSpPr>
+          <p:nvPr>
+            <p:ph type="sldNum" sz="quarter" idx="10"/>
+          </p:nvPr>
+        </p:nvSpPr>
+        <p:spPr/>
+        <p:txBody>
+          <a:bodyPr/>
+          <a:lstStyle/>
+          <a:p>
+            <a:fld id="{4E0E9D85-81CD-44C8-8F15-3AA06C34AF8C}" type="slidenum">
+              <a:rPr lang="en-US" smtClean="0"/>
+              <a:t>12</a:t>
+            </a:fld>
+            <a:endParaRPr lang="en-US"/>
+          </a:p>
+        </p:txBody>
+      </p:sp>
+    </p:spTree>
+    <p:extLst>
+      <p:ext uri="{BB962C8B-B14F-4D97-AF65-F5344CB8AC3E}">
+        <p14:creationId xmlns:p14="http://schemas.microsoft.com/office/powerpoint/2010/main" val="4069510992"/>
+      </p:ext>
+    </p:extLst>
+  </p:cSld>
+  <p:clrMapOvr>
+    <a:masterClrMapping/>
+  </p:clrMapOvr>
+</p:notes>
+</file>
+
+<file path=ppt/notesSlides/notesSlide13.xml><?xml version="1.0" encoding="utf-8"?>
+<p:notes xmlns:a="http://schemas.openxmlformats.org/drawingml/2006/main" xmlns:r="http://schemas.openxmlformats.org/officeDocument/2006/relationships" xmlns:p="http://schemas.openxmlformats.org/presentationml/2006/main">
+  <p:cSld>
+    <p:spTree>
+      <p:nvGrpSpPr>
+        <p:cNvPr id="1" name=""/>
+        <p:cNvGrpSpPr/>
+        <p:nvPr/>
+      </p:nvGrpSpPr>
+      <p:grpSpPr>
+        <a:xfrm>
+          <a:off x="0" y="0"/>
+          <a:ext cx="0" cy="0"/>
+          <a:chOff x="0" y="0"/>
+          <a:chExt cx="0" cy="0"/>
+        </a:xfrm>
+      </p:grpSpPr>
+      <p:sp>
+        <p:nvSpPr>
+          <p:cNvPr id="2" name="Slide Image Placeholder 1"/>
+          <p:cNvSpPr>
+            <a:spLocks noGrp="1" noRot="1" noChangeAspect="1"/>
+          </p:cNvSpPr>
+          <p:nvPr>
+            <p:ph type="sldImg"/>
+          </p:nvPr>
+        </p:nvSpPr>
+        <p:spPr/>
+      </p:sp>
+      <p:sp>
+        <p:nvSpPr>
+          <p:cNvPr id="3" name="Notes Placeholder 2"/>
+          <p:cNvSpPr>
+            <a:spLocks noGrp="1"/>
+          </p:cNvSpPr>
+          <p:nvPr>
+            <p:ph type="body" idx="1"/>
+          </p:nvPr>
+        </p:nvSpPr>
+        <p:spPr/>
+        <p:txBody>
+          <a:bodyPr/>
+          <a:lstStyle/>
+          <a:p>
+            <a:endParaRPr lang="en-US"/>
+          </a:p>
+        </p:txBody>
+      </p:sp>
+      <p:sp>
+        <p:nvSpPr>
+          <p:cNvPr id="4" name="Slide Number Placeholder 3"/>
+          <p:cNvSpPr>
+            <a:spLocks noGrp="1"/>
+          </p:cNvSpPr>
+          <p:nvPr>
+            <p:ph type="sldNum" sz="quarter" idx="10"/>
+          </p:nvPr>
+        </p:nvSpPr>
+        <p:spPr/>
+        <p:txBody>
+          <a:bodyPr/>
+          <a:lstStyle/>
+          <a:p>
+            <a:fld id="{4E0E9D85-81CD-44C8-8F15-3AA06C34AF8C}" type="slidenum">
+              <a:rPr lang="en-US" smtClean="0"/>
+              <a:t>13</a:t>
+            </a:fld>
+            <a:endParaRPr lang="en-US"/>
+          </a:p>
+        </p:txBody>
+      </p:sp>
+    </p:spTree>
+    <p:extLst>
+      <p:ext uri="{BB962C8B-B14F-4D97-AF65-F5344CB8AC3E}">
+        <p14:creationId xmlns:p14="http://schemas.microsoft.com/office/powerpoint/2010/main" val="3157502160"/>
+      </p:ext>
+    </p:extLst>
+  </p:cSld>
+  <p:clrMapOvr>
+    <a:masterClrMapping/>
+  </p:clrMapOvr>
+</p:notes>
+</file>
+
 <file path=ppt/notesSlides/notesSlide2.xml><?xml version="1.0" encoding="utf-8"?>
 <p:notes xmlns:a="http://schemas.openxmlformats.org/drawingml/2006/main" xmlns:r="http://schemas.openxmlformats.org/officeDocument/2006/relationships" xmlns:p="http://schemas.openxmlformats.org/presentationml/2006/main">
   <p:cSld>
@@ -909,7 +1249,7 @@
     </p:spTree>
     <p:extLst>
       <p:ext uri="{BB962C8B-B14F-4D97-AF65-F5344CB8AC3E}">
-        <p14:creationId xmlns:p14="http://schemas.microsoft.com/office/powerpoint/2010/main" val="1394366699"/>
+        <p14:creationId xmlns:p14="http://schemas.microsoft.com/office/powerpoint/2010/main" val="3985799748"/>
       </p:ext>
     </p:extLst>
   </p:cSld>
@@ -993,7 +1333,7 @@
     </p:spTree>
     <p:extLst>
       <p:ext uri="{BB962C8B-B14F-4D97-AF65-F5344CB8AC3E}">
-        <p14:creationId xmlns:p14="http://schemas.microsoft.com/office/powerpoint/2010/main" val="1667884131"/>
+        <p14:creationId xmlns:p14="http://schemas.microsoft.com/office/powerpoint/2010/main" val="3087359922"/>
       </p:ext>
     </p:extLst>
   </p:cSld>
@@ -1077,7 +1417,7 @@
     </p:spTree>
     <p:extLst>
       <p:ext uri="{BB962C8B-B14F-4D97-AF65-F5344CB8AC3E}">
-        <p14:creationId xmlns:p14="http://schemas.microsoft.com/office/powerpoint/2010/main" val="2698663576"/>
+        <p14:creationId xmlns:p14="http://schemas.microsoft.com/office/powerpoint/2010/main" val="1395353083"/>
       </p:ext>
     </p:extLst>
   </p:cSld>
@@ -1161,7 +1501,7 @@
     </p:spTree>
     <p:extLst>
       <p:ext uri="{BB962C8B-B14F-4D97-AF65-F5344CB8AC3E}">
-        <p14:creationId xmlns:p14="http://schemas.microsoft.com/office/powerpoint/2010/main" val="4069510992"/>
+        <p14:creationId xmlns:p14="http://schemas.microsoft.com/office/powerpoint/2010/main" val="2000614478"/>
       </p:ext>
     </p:extLst>
   </p:cSld>
@@ -1245,7 +1585,7 @@
     </p:spTree>
     <p:extLst>
       <p:ext uri="{BB962C8B-B14F-4D97-AF65-F5344CB8AC3E}">
-        <p14:creationId xmlns:p14="http://schemas.microsoft.com/office/powerpoint/2010/main" val="3157502160"/>
+        <p14:creationId xmlns:p14="http://schemas.microsoft.com/office/powerpoint/2010/main" val="834080314"/>
       </p:ext>
     </p:extLst>
   </p:cSld>
@@ -1787,7 +2127,7 @@
               <a:pPr>
                 <a:defRPr/>
               </a:pPr>
-              <a:t>1/13/2018</a:t>
+              <a:t>1/14/2018</a:t>
             </a:fld>
             <a:endParaRPr lang="en-US"/>
           </a:p>
@@ -1972,7 +2312,7 @@
           <a:p>
             <a:fld id="{DFF43710-F8AB-6840-B03A-23D4C2B2884A}" type="datetimeFigureOut">
               <a:rPr lang="en-US" smtClean="0"/>
-              <a:t>1/13/2018</a:t>
+              <a:t>1/14/2018</a:t>
             </a:fld>
             <a:endParaRPr lang="en-US"/>
           </a:p>
@@ -2217,7 +2557,7 @@
               <a:pPr defTabSz="914400">
                 <a:defRPr/>
               </a:pPr>
-              <a:t>1/13/2018</a:t>
+              <a:t>1/14/2018</a:t>
             </a:fld>
             <a:endParaRPr lang="en-US"/>
           </a:p>
@@ -3470,6 +3810,664 @@
 </p:sld>
 </file>
 
+<file path=ppt/slides/slide10.xml><?xml version="1.0" encoding="utf-8"?>
+<p:sld xmlns:a="http://schemas.openxmlformats.org/drawingml/2006/main" xmlns:r="http://schemas.openxmlformats.org/officeDocument/2006/relationships" xmlns:p="http://schemas.openxmlformats.org/presentationml/2006/main">
+  <p:cSld>
+    <p:spTree>
+      <p:nvGrpSpPr>
+        <p:cNvPr id="1" name=""/>
+        <p:cNvGrpSpPr/>
+        <p:nvPr/>
+      </p:nvGrpSpPr>
+      <p:grpSpPr>
+        <a:xfrm>
+          <a:off x="0" y="0"/>
+          <a:ext cx="0" cy="0"/>
+          <a:chOff x="0" y="0"/>
+          <a:chExt cx="0" cy="0"/>
+        </a:xfrm>
+      </p:grpSpPr>
+      <p:sp>
+        <p:nvSpPr>
+          <p:cNvPr id="2" name="Title 1"/>
+          <p:cNvSpPr>
+            <a:spLocks noGrp="1"/>
+          </p:cNvSpPr>
+          <p:nvPr>
+            <p:ph type="title"/>
+          </p:nvPr>
+        </p:nvSpPr>
+        <p:spPr>
+          <a:xfrm>
+            <a:off x="9111" y="0"/>
+            <a:ext cx="9144000" cy="589085"/>
+          </a:xfrm>
+        </p:spPr>
+        <p:txBody>
+          <a:bodyPr>
+            <a:normAutofit/>
+          </a:bodyPr>
+          <a:lstStyle/>
+          <a:p>
+            <a:r>
+              <a:rPr lang="en-US" dirty="0"/>
+              <a:t>Using GitHub</a:t>
+            </a:r>
+            <a:endParaRPr lang="en-US" b="0" dirty="0"/>
+          </a:p>
+        </p:txBody>
+      </p:sp>
+      <p:sp>
+        <p:nvSpPr>
+          <p:cNvPr id="3" name="Content Placeholder 2"/>
+          <p:cNvSpPr>
+            <a:spLocks noGrp="1"/>
+          </p:cNvSpPr>
+          <p:nvPr>
+            <p:ph idx="1"/>
+          </p:nvPr>
+        </p:nvSpPr>
+        <p:spPr>
+          <a:xfrm>
+            <a:off x="276639" y="653144"/>
+            <a:ext cx="8608944" cy="5580508"/>
+          </a:xfrm>
+        </p:spPr>
+        <p:txBody>
+          <a:bodyPr>
+            <a:normAutofit/>
+          </a:bodyPr>
+          <a:lstStyle/>
+          <a:p>
+            <a:r>
+              <a:rPr lang="en-US" dirty="0"/>
+              <a:t>GitHub &amp; Bitbucket are two of the largest web-based hosting services</a:t>
+            </a:r>
+          </a:p>
+          <a:p>
+            <a:pPr lvl="1"/>
+            <a:endParaRPr lang="en-US" dirty="0"/>
+          </a:p>
+          <a:p>
+            <a:pPr lvl="1"/>
+            <a:r>
+              <a:rPr lang="en-US" dirty="0"/>
+              <a:t>they are targeted towards software development projects</a:t>
+            </a:r>
+          </a:p>
+          <a:p>
+            <a:pPr lvl="2"/>
+            <a:r>
+              <a:rPr lang="en-US" dirty="0"/>
+              <a:t>can be used for proposals, papers or any collection of documents</a:t>
+            </a:r>
+          </a:p>
+          <a:p>
+            <a:pPr lvl="1"/>
+            <a:r>
+              <a:rPr lang="en-US" dirty="0"/>
+              <a:t>neither supports Subversion (SVN)</a:t>
+            </a:r>
+          </a:p>
+          <a:p>
+            <a:pPr lvl="2"/>
+            <a:r>
+              <a:rPr lang="en-US" dirty="0"/>
+              <a:t>GitHub exclusively supports </a:t>
+            </a:r>
+            <a:r>
+              <a:rPr lang="en-US" b="0" dirty="0">
+                <a:solidFill>
+                  <a:schemeClr val="tx1"/>
+                </a:solidFill>
+                <a:latin typeface="Courier New" panose="02070309020205020404" pitchFamily="49" charset="0"/>
+                <a:cs typeface="Courier New" panose="02070309020205020404" pitchFamily="49" charset="0"/>
+              </a:rPr>
+              <a:t>git</a:t>
+            </a:r>
+            <a:r>
+              <a:rPr lang="en-US" dirty="0"/>
+              <a:t>;  Bitbucket supports </a:t>
+            </a:r>
+            <a:r>
+              <a:rPr lang="en-US" sz="1600" b="0" dirty="0">
+                <a:solidFill>
+                  <a:schemeClr val="tx1"/>
+                </a:solidFill>
+                <a:latin typeface="Courier New" panose="02070309020205020404" pitchFamily="49" charset="0"/>
+                <a:cs typeface="Courier New" panose="02070309020205020404" pitchFamily="49" charset="0"/>
+              </a:rPr>
+              <a:t>git</a:t>
+            </a:r>
+            <a:r>
+              <a:rPr lang="en-US" dirty="0"/>
+              <a:t> and </a:t>
+            </a:r>
+            <a:r>
+              <a:rPr lang="en-US" sz="1600" b="0" dirty="0">
+                <a:solidFill>
+                  <a:schemeClr val="tx1"/>
+                </a:solidFill>
+                <a:latin typeface="Courier New" panose="02070309020205020404" pitchFamily="49" charset="0"/>
+                <a:cs typeface="Courier New" panose="02070309020205020404" pitchFamily="49" charset="0"/>
+              </a:rPr>
+              <a:t>mercurial</a:t>
+            </a:r>
+            <a:endParaRPr lang="en-US" b="0" dirty="0">
+              <a:solidFill>
+                <a:schemeClr val="tx1"/>
+              </a:solidFill>
+              <a:latin typeface="Courier New" panose="02070309020205020404" pitchFamily="49" charset="0"/>
+              <a:cs typeface="Courier New" panose="02070309020205020404" pitchFamily="49" charset="0"/>
+            </a:endParaRPr>
+          </a:p>
+          <a:p>
+            <a:r>
+              <a:rPr lang="en-US" dirty="0"/>
+              <a:t>GitHub provides the following features (and more):</a:t>
+            </a:r>
+          </a:p>
+          <a:p>
+            <a:pPr lvl="1"/>
+            <a:r>
+              <a:rPr lang="en-US" dirty="0"/>
+              <a:t>an integrated issue tracker</a:t>
+            </a:r>
+          </a:p>
+          <a:p>
+            <a:pPr lvl="1"/>
+            <a:r>
+              <a:rPr lang="en-US" dirty="0"/>
+              <a:t>branch comparison views</a:t>
+            </a:r>
+          </a:p>
+          <a:p>
+            <a:pPr lvl="1"/>
+            <a:r>
+              <a:rPr lang="en-US" dirty="0"/>
+              <a:t>native applications for Windows and Mac desktops</a:t>
+            </a:r>
+          </a:p>
+          <a:p>
+            <a:pPr lvl="2"/>
+            <a:r>
+              <a:rPr lang="en-US" dirty="0"/>
+              <a:t>https://desktop.github.com/</a:t>
+            </a:r>
+          </a:p>
+          <a:p>
+            <a:pPr lvl="1"/>
+            <a:r>
+              <a:rPr lang="en-US" dirty="0"/>
+              <a:t>support for over 200 programming languages and data formats</a:t>
+            </a:r>
+          </a:p>
+          <a:p>
+            <a:pPr lvl="1"/>
+            <a:r>
+              <a:rPr lang="en-US" dirty="0"/>
+              <a:t>GitHub pages, a feature for publishing and hosting</a:t>
+            </a:r>
+          </a:p>
+          <a:p>
+            <a:pPr lvl="1"/>
+            <a:r>
+              <a:rPr lang="en-US" dirty="0"/>
+              <a:t>SSL, SSH &amp; https for data transmission;  two-factor authentication for login</a:t>
+            </a:r>
+          </a:p>
+          <a:p>
+            <a:pPr lvl="1"/>
+            <a:r>
+              <a:rPr lang="en-US" dirty="0"/>
+              <a:t>API integration for 3</a:t>
+            </a:r>
+            <a:r>
+              <a:rPr lang="en-US" baseline="30000" dirty="0"/>
+              <a:t>rd</a:t>
+            </a:r>
+            <a:r>
+              <a:rPr lang="en-US" dirty="0"/>
+              <a:t>-party tool and other platforms</a:t>
+            </a:r>
+          </a:p>
+          <a:p>
+            <a:pPr lvl="1"/>
+            <a:r>
+              <a:rPr lang="en-US" dirty="0"/>
+              <a:t>partial support is provided for </a:t>
+            </a:r>
+            <a:r>
+              <a:rPr lang="en-US" sz="1800" dirty="0">
+                <a:solidFill>
+                  <a:schemeClr val="tx1"/>
+                </a:solidFill>
+                <a:latin typeface="Courier New" panose="02070309020205020404" pitchFamily="49" charset="0"/>
+                <a:cs typeface="Courier New" panose="02070309020205020404" pitchFamily="49" charset="0"/>
+              </a:rPr>
+              <a:t>SVN</a:t>
+            </a:r>
+            <a:endParaRPr lang="en-US" dirty="0">
+              <a:solidFill>
+                <a:schemeClr val="tx1"/>
+              </a:solidFill>
+              <a:latin typeface="Courier New" panose="02070309020205020404" pitchFamily="49" charset="0"/>
+              <a:cs typeface="Courier New" panose="02070309020205020404" pitchFamily="49" charset="0"/>
+            </a:endParaRPr>
+          </a:p>
+          <a:p>
+            <a:pPr lvl="2"/>
+            <a:r>
+              <a:rPr lang="en-US" dirty="0"/>
+              <a:t>import SVN repos into git</a:t>
+            </a:r>
+          </a:p>
+          <a:p>
+            <a:pPr lvl="2"/>
+            <a:r>
+              <a:rPr lang="en-US" dirty="0"/>
+              <a:t>GitHub repos can be cloned directly via the SVN client.</a:t>
+            </a:r>
+          </a:p>
+        </p:txBody>
+      </p:sp>
+      <p:sp>
+        <p:nvSpPr>
+          <p:cNvPr id="4" name="TextBox 3">
+            <a:extLst>
+              <a:ext uri="{FF2B5EF4-FFF2-40B4-BE49-F238E27FC236}">
+                <a16:creationId xmlns:a16="http://schemas.microsoft.com/office/drawing/2014/main" id="{97DE75EA-783B-4A37-9C7A-39FAED9F70AD}"/>
+              </a:ext>
+            </a:extLst>
+          </p:cNvPr>
+          <p:cNvSpPr txBox="1"/>
+          <p:nvPr/>
+        </p:nvSpPr>
+        <p:spPr>
+          <a:xfrm>
+            <a:off x="2540063" y="968229"/>
+            <a:ext cx="6603937" cy="338554"/>
+          </a:xfrm>
+          <a:prstGeom prst="rect">
+            <a:avLst/>
+          </a:prstGeom>
+          <a:noFill/>
+        </p:spPr>
+        <p:txBody>
+          <a:bodyPr wrap="square" rtlCol="0">
+            <a:spAutoFit/>
+          </a:bodyPr>
+          <a:lstStyle/>
+          <a:p>
+            <a:pPr marL="227013" indent="-227013">
+              <a:spcBef>
+                <a:spcPts val="300"/>
+              </a:spcBef>
+            </a:pPr>
+            <a:r>
+              <a:rPr lang="en-US" sz="1600" dirty="0">
+                <a:latin typeface="Times New Roman" panose="02020603050405020304" pitchFamily="18" charset="0"/>
+                <a:cs typeface="Times New Roman" panose="02020603050405020304" pitchFamily="18" charset="0"/>
+              </a:rPr>
+              <a:t>for a comparison, see  </a:t>
+            </a:r>
+            <a:r>
+              <a:rPr lang="en-US" sz="1600" dirty="0">
+                <a:latin typeface="Times New Roman" panose="02020603050405020304" pitchFamily="18" charset="0"/>
+                <a:cs typeface="Times New Roman" panose="02020603050405020304" pitchFamily="18" charset="0"/>
+                <a:hlinkClick r:id="rId3"/>
+              </a:rPr>
+              <a:t>https://www.upguard.com/articles/github-vs-bitbucket</a:t>
+            </a:r>
+            <a:r>
+              <a:rPr lang="en-US" sz="1600" dirty="0">
+                <a:latin typeface="Times New Roman" panose="02020603050405020304" pitchFamily="18" charset="0"/>
+                <a:cs typeface="Times New Roman" panose="02020603050405020304" pitchFamily="18" charset="0"/>
+              </a:rPr>
+              <a:t>  </a:t>
+            </a:r>
+          </a:p>
+        </p:txBody>
+      </p:sp>
+    </p:spTree>
+    <p:extLst>
+      <p:ext uri="{BB962C8B-B14F-4D97-AF65-F5344CB8AC3E}">
+        <p14:creationId xmlns:p14="http://schemas.microsoft.com/office/powerpoint/2010/main" val="2274151764"/>
+      </p:ext>
+    </p:extLst>
+  </p:cSld>
+  <p:clrMapOvr>
+    <a:masterClrMapping/>
+  </p:clrMapOvr>
+</p:sld>
+</file>
+
+<file path=ppt/slides/slide11.xml><?xml version="1.0" encoding="utf-8"?>
+<p:sld xmlns:a="http://schemas.openxmlformats.org/drawingml/2006/main" xmlns:r="http://schemas.openxmlformats.org/officeDocument/2006/relationships" xmlns:p="http://schemas.openxmlformats.org/presentationml/2006/main">
+  <p:cSld>
+    <p:spTree>
+      <p:nvGrpSpPr>
+        <p:cNvPr id="1" name=""/>
+        <p:cNvGrpSpPr/>
+        <p:nvPr/>
+      </p:nvGrpSpPr>
+      <p:grpSpPr>
+        <a:xfrm>
+          <a:off x="0" y="0"/>
+          <a:ext cx="0" cy="0"/>
+          <a:chOff x="0" y="0"/>
+          <a:chExt cx="0" cy="0"/>
+        </a:xfrm>
+      </p:grpSpPr>
+      <p:pic>
+        <p:nvPicPr>
+          <p:cNvPr id="8" name="Picture 7">
+            <a:extLst>
+              <a:ext uri="{FF2B5EF4-FFF2-40B4-BE49-F238E27FC236}">
+                <a16:creationId xmlns:a16="http://schemas.microsoft.com/office/drawing/2014/main" id="{683A3D10-4CC3-48CB-905D-DF3F31119B55}"/>
+              </a:ext>
+            </a:extLst>
+          </p:cNvPr>
+          <p:cNvPicPr>
+            <a:picLocks noChangeAspect="1"/>
+          </p:cNvPicPr>
+          <p:nvPr/>
+        </p:nvPicPr>
+        <p:blipFill rotWithShape="1">
+          <a:blip r:embed="rId3"/>
+          <a:srcRect b="13104"/>
+          <a:stretch/>
+        </p:blipFill>
+        <p:spPr>
+          <a:xfrm>
+            <a:off x="223601" y="16728"/>
+            <a:ext cx="7753450" cy="5610072"/>
+          </a:xfrm>
+          <a:prstGeom prst="rect">
+            <a:avLst/>
+          </a:prstGeom>
+        </p:spPr>
+      </p:pic>
+      <p:sp>
+        <p:nvSpPr>
+          <p:cNvPr id="3" name="TextBox 2">
+            <a:extLst>
+              <a:ext uri="{FF2B5EF4-FFF2-40B4-BE49-F238E27FC236}">
+                <a16:creationId xmlns:a16="http://schemas.microsoft.com/office/drawing/2014/main" id="{F79BAF6B-CF2F-4C8F-9A35-532D9626EBA2}"/>
+              </a:ext>
+            </a:extLst>
+          </p:cNvPr>
+          <p:cNvSpPr txBox="1"/>
+          <p:nvPr/>
+        </p:nvSpPr>
+        <p:spPr>
+          <a:xfrm>
+            <a:off x="1475935" y="5872161"/>
+            <a:ext cx="7668065" cy="338554"/>
+          </a:xfrm>
+          <a:prstGeom prst="rect">
+            <a:avLst/>
+          </a:prstGeom>
+          <a:noFill/>
+        </p:spPr>
+        <p:txBody>
+          <a:bodyPr wrap="square" rtlCol="0">
+            <a:spAutoFit/>
+          </a:bodyPr>
+          <a:lstStyle/>
+          <a:p>
+            <a:pPr marL="227013" indent="-227013">
+              <a:spcBef>
+                <a:spcPts val="300"/>
+              </a:spcBef>
+            </a:pPr>
+            <a:r>
+              <a:rPr lang="en-US" sz="1600" dirty="0">
+                <a:latin typeface="Times New Roman" panose="02020603050405020304" pitchFamily="18" charset="0"/>
+                <a:cs typeface="Times New Roman" panose="02020603050405020304" pitchFamily="18" charset="0"/>
+              </a:rPr>
+              <a:t>Go to GitHub docs for interactive explanation, </a:t>
+            </a:r>
+            <a:r>
+              <a:rPr lang="en-US" sz="1600" dirty="0">
+                <a:latin typeface="Times New Roman" panose="02020603050405020304" pitchFamily="18" charset="0"/>
+                <a:cs typeface="Times New Roman" panose="02020603050405020304" pitchFamily="18" charset="0"/>
+                <a:hlinkClick r:id="rId4"/>
+              </a:rPr>
+              <a:t>https://guides.github.com/introduction/flow</a:t>
+            </a:r>
+            <a:r>
+              <a:rPr lang="en-US" sz="1600" dirty="0">
+                <a:latin typeface="Times New Roman" panose="02020603050405020304" pitchFamily="18" charset="0"/>
+                <a:cs typeface="Times New Roman" panose="02020603050405020304" pitchFamily="18" charset="0"/>
+              </a:rPr>
+              <a:t> </a:t>
+            </a:r>
+          </a:p>
+        </p:txBody>
+      </p:sp>
+    </p:spTree>
+    <p:extLst>
+      <p:ext uri="{BB962C8B-B14F-4D97-AF65-F5344CB8AC3E}">
+        <p14:creationId xmlns:p14="http://schemas.microsoft.com/office/powerpoint/2010/main" val="2040364059"/>
+      </p:ext>
+    </p:extLst>
+  </p:cSld>
+  <p:clrMapOvr>
+    <a:masterClrMapping/>
+  </p:clrMapOvr>
+</p:sld>
+</file>
+
+<file path=ppt/slides/slide12.xml><?xml version="1.0" encoding="utf-8"?>
+<p:sld xmlns:a="http://schemas.openxmlformats.org/drawingml/2006/main" xmlns:r="http://schemas.openxmlformats.org/officeDocument/2006/relationships" xmlns:p="http://schemas.openxmlformats.org/presentationml/2006/main">
+  <p:cSld>
+    <p:spTree>
+      <p:nvGrpSpPr>
+        <p:cNvPr id="1" name=""/>
+        <p:cNvGrpSpPr/>
+        <p:nvPr/>
+      </p:nvGrpSpPr>
+      <p:grpSpPr>
+        <a:xfrm>
+          <a:off x="0" y="0"/>
+          <a:ext cx="0" cy="0"/>
+          <a:chOff x="0" y="0"/>
+          <a:chExt cx="0" cy="0"/>
+        </a:xfrm>
+      </p:grpSpPr>
+      <p:sp>
+        <p:nvSpPr>
+          <p:cNvPr id="2" name="Title 1"/>
+          <p:cNvSpPr>
+            <a:spLocks noGrp="1"/>
+          </p:cNvSpPr>
+          <p:nvPr>
+            <p:ph type="title"/>
+          </p:nvPr>
+        </p:nvSpPr>
+        <p:spPr>
+          <a:xfrm>
+            <a:off x="0" y="140672"/>
+            <a:ext cx="9144000" cy="589085"/>
+          </a:xfrm>
+        </p:spPr>
+        <p:txBody>
+          <a:bodyPr>
+            <a:normAutofit/>
+          </a:bodyPr>
+          <a:lstStyle/>
+          <a:p>
+            <a:r>
+              <a:rPr lang="en-US" dirty="0"/>
+              <a:t>Class discussion:</a:t>
+            </a:r>
+          </a:p>
+        </p:txBody>
+      </p:sp>
+      <p:sp>
+        <p:nvSpPr>
+          <p:cNvPr id="6" name="Content Placeholder 2">
+            <a:extLst>
+              <a:ext uri="{FF2B5EF4-FFF2-40B4-BE49-F238E27FC236}">
+                <a16:creationId xmlns:a16="http://schemas.microsoft.com/office/drawing/2014/main" id="{9081FF26-7AD5-4767-AF65-A27F1769E1FC}"/>
+              </a:ext>
+            </a:extLst>
+          </p:cNvPr>
+          <p:cNvSpPr>
+            <a:spLocks noGrp="1"/>
+          </p:cNvSpPr>
+          <p:nvPr>
+            <p:ph idx="1"/>
+          </p:nvPr>
+        </p:nvSpPr>
+        <p:spPr>
+          <a:xfrm>
+            <a:off x="152400" y="827314"/>
+            <a:ext cx="8839200" cy="5146766"/>
+          </a:xfrm>
+        </p:spPr>
+        <p:txBody>
+          <a:bodyPr>
+            <a:normAutofit/>
+          </a:bodyPr>
+          <a:lstStyle/>
+          <a:p>
+            <a:r>
+              <a:rPr lang="en-US" sz="1800" i="0" dirty="0"/>
+              <a:t>TBD…</a:t>
+            </a:r>
+            <a:endParaRPr lang="en-US" i="0" dirty="0"/>
+          </a:p>
+        </p:txBody>
+      </p:sp>
+    </p:spTree>
+    <p:extLst>
+      <p:ext uri="{BB962C8B-B14F-4D97-AF65-F5344CB8AC3E}">
+        <p14:creationId xmlns:p14="http://schemas.microsoft.com/office/powerpoint/2010/main" val="2046148354"/>
+      </p:ext>
+    </p:extLst>
+  </p:cSld>
+  <p:clrMapOvr>
+    <a:masterClrMapping/>
+  </p:clrMapOvr>
+</p:sld>
+</file>
+
+<file path=ppt/slides/slide13.xml><?xml version="1.0" encoding="utf-8"?>
+<p:sld xmlns:a="http://schemas.openxmlformats.org/drawingml/2006/main" xmlns:r="http://schemas.openxmlformats.org/officeDocument/2006/relationships" xmlns:p="http://schemas.openxmlformats.org/presentationml/2006/main">
+  <p:cSld>
+    <p:spTree>
+      <p:nvGrpSpPr>
+        <p:cNvPr id="1" name=""/>
+        <p:cNvGrpSpPr/>
+        <p:nvPr/>
+      </p:nvGrpSpPr>
+      <p:grpSpPr>
+        <a:xfrm>
+          <a:off x="0" y="0"/>
+          <a:ext cx="0" cy="0"/>
+          <a:chOff x="0" y="0"/>
+          <a:chExt cx="0" cy="0"/>
+        </a:xfrm>
+      </p:grpSpPr>
+      <p:sp>
+        <p:nvSpPr>
+          <p:cNvPr id="2" name="Title 1"/>
+          <p:cNvSpPr>
+            <a:spLocks noGrp="1"/>
+          </p:cNvSpPr>
+          <p:nvPr>
+            <p:ph type="title"/>
+          </p:nvPr>
+        </p:nvSpPr>
+        <p:spPr>
+          <a:xfrm>
+            <a:off x="0" y="70385"/>
+            <a:ext cx="9144000" cy="589085"/>
+          </a:xfrm>
+        </p:spPr>
+        <p:txBody>
+          <a:bodyPr>
+            <a:normAutofit/>
+          </a:bodyPr>
+          <a:lstStyle/>
+          <a:p>
+            <a:r>
+              <a:rPr lang="en-US" dirty="0"/>
+              <a:t>Wrap up</a:t>
+            </a:r>
+          </a:p>
+        </p:txBody>
+      </p:sp>
+      <p:sp>
+        <p:nvSpPr>
+          <p:cNvPr id="3" name="Content Placeholder 2"/>
+          <p:cNvSpPr>
+            <a:spLocks noGrp="1"/>
+          </p:cNvSpPr>
+          <p:nvPr>
+            <p:ph idx="1"/>
+          </p:nvPr>
+        </p:nvSpPr>
+        <p:spPr>
+          <a:xfrm>
+            <a:off x="152400" y="862150"/>
+            <a:ext cx="8839200" cy="5441932"/>
+          </a:xfrm>
+        </p:spPr>
+        <p:txBody>
+          <a:bodyPr>
+            <a:normAutofit/>
+          </a:bodyPr>
+          <a:lstStyle/>
+          <a:p>
+            <a:r>
+              <a:rPr lang="en-US" dirty="0"/>
+              <a:t>TBD…</a:t>
+            </a:r>
+          </a:p>
+          <a:p>
+            <a:pPr lvl="1"/>
+            <a:endParaRPr lang="en-US" dirty="0"/>
+          </a:p>
+          <a:p>
+            <a:r>
+              <a:rPr lang="en-US" dirty="0"/>
+              <a:t>Any final questions regarding the material in this lecture?</a:t>
+            </a:r>
+          </a:p>
+          <a:p>
+            <a:endParaRPr lang="en-US" dirty="0"/>
+          </a:p>
+          <a:p>
+            <a:r>
+              <a:rPr lang="en-US" dirty="0"/>
+              <a:t>Computer Lab this afternoon – </a:t>
+            </a:r>
+          </a:p>
+          <a:p>
+            <a:pPr lvl="1"/>
+            <a:r>
+              <a:rPr lang="en-US" dirty="0"/>
+              <a:t>TBD…</a:t>
+            </a:r>
+          </a:p>
+        </p:txBody>
+      </p:sp>
+    </p:spTree>
+    <p:extLst>
+      <p:ext uri="{BB962C8B-B14F-4D97-AF65-F5344CB8AC3E}">
+        <p14:creationId xmlns:p14="http://schemas.microsoft.com/office/powerpoint/2010/main" val="12542219"/>
+      </p:ext>
+    </p:extLst>
+  </p:cSld>
+  <p:clrMapOvr>
+    <a:masterClrMapping/>
+  </p:clrMapOvr>
+</p:sld>
+</file>
+
 <file path=ppt/slides/slide2.xml><?xml version="1.0" encoding="utf-8"?>
 <p:sld xmlns:a="http://schemas.openxmlformats.org/drawingml/2006/main" xmlns:r="http://schemas.openxmlformats.org/officeDocument/2006/relationships" xmlns:p="http://schemas.openxmlformats.org/presentationml/2006/main">
   <p:cSld>
@@ -3511,7 +4509,7 @@
           <a:p>
             <a:r>
               <a:rPr lang="en-US" dirty="0"/>
-              <a:t>Centralized software version control</a:t>
+              <a:t>Centralized version control systems (VCS)</a:t>
             </a:r>
           </a:p>
         </p:txBody>
@@ -3540,7 +4538,7 @@
           <a:p>
             <a:r>
               <a:rPr lang="en-US" dirty="0"/>
-              <a:t>Version control is a system that records changes to a set of files</a:t>
+              <a:t>A version control system (VCS) records changes to a set of files</a:t>
             </a:r>
           </a:p>
           <a:p>
@@ -3773,7 +4771,7 @@
           <a:p>
             <a:r>
               <a:rPr lang="en-US" dirty="0"/>
-              <a:t>Centralized version control</a:t>
+              <a:t>Centralized version control systems</a:t>
             </a:r>
           </a:p>
           <a:p>
@@ -3814,7 +4812,7 @@
           <a:p>
             <a:r>
               <a:rPr lang="en-US" dirty="0"/>
-              <a:t>Distributed version control</a:t>
+              <a:t>Distributed version control systems</a:t>
             </a:r>
           </a:p>
           <a:p>
@@ -4009,7 +5007,7 @@
           <a:p>
             <a:r>
               <a:rPr lang="en-US" dirty="0"/>
-              <a:t>git</a:t>
+              <a:t>git – Getting Started</a:t>
             </a:r>
           </a:p>
         </p:txBody>
@@ -4037,9 +5035,114 @@
           <a:lstStyle/>
           <a:p>
             <a:r>
-              <a:rPr lang="en-US" dirty="0" err="1"/>
-              <a:t>tbd</a:t>
-            </a:r>
+              <a:rPr lang="en-US" dirty="0"/>
+              <a:t>It is assumed you are working on the Linux command line</a:t>
+            </a:r>
+          </a:p>
+          <a:p>
+            <a:pPr lvl="1"/>
+            <a:endParaRPr lang="en-US" dirty="0"/>
+          </a:p>
+          <a:p>
+            <a:r>
+              <a:rPr lang="en-US" dirty="0"/>
+              <a:t>Establish your git identity (name &amp; email) for the local client</a:t>
+            </a:r>
+          </a:p>
+          <a:p>
+            <a:pPr lvl="1"/>
+            <a:r>
+              <a:rPr lang="en-US" dirty="0"/>
+              <a:t>every git commit uses this information</a:t>
+            </a:r>
+          </a:p>
+          <a:p>
+            <a:pPr lvl="1"/>
+            <a:r>
+              <a:rPr lang="en-US" dirty="0"/>
+              <a:t>it’s immutably baked into the commits you start creating</a:t>
+            </a:r>
+          </a:p>
+          <a:p>
+            <a:pPr marL="801688" indent="0">
+              <a:buNone/>
+            </a:pPr>
+            <a:r>
+              <a:rPr lang="en-US" sz="1600" dirty="0">
+                <a:latin typeface="Courier New" panose="02070309020205020404" pitchFamily="49" charset="0"/>
+                <a:cs typeface="Courier New" panose="02070309020205020404" pitchFamily="49" charset="0"/>
+              </a:rPr>
+              <a:t>$ git config --global user.name "My Name" </a:t>
+            </a:r>
+          </a:p>
+          <a:p>
+            <a:pPr marL="801688" indent="0">
+              <a:buNone/>
+            </a:pPr>
+            <a:r>
+              <a:rPr lang="en-US" sz="1600" dirty="0">
+                <a:latin typeface="Courier New" panose="02070309020205020404" pitchFamily="49" charset="0"/>
+                <a:cs typeface="Courier New" panose="02070309020205020404" pitchFamily="49" charset="0"/>
+              </a:rPr>
+              <a:t>$ git config --global user.email my_name@example.com</a:t>
+            </a:r>
+            <a:r>
+              <a:rPr lang="en-US" dirty="0"/>
+              <a:t> </a:t>
+            </a:r>
+          </a:p>
+          <a:p>
+            <a:pPr lvl="1"/>
+            <a:r>
+              <a:rPr lang="en-US" dirty="0"/>
+              <a:t>you need do this only once if you pass the --global option</a:t>
+            </a:r>
+          </a:p>
+          <a:p>
+            <a:pPr lvl="1"/>
+            <a:r>
+              <a:rPr lang="en-US" dirty="0"/>
+              <a:t>many GUI tools will help you do this when you first run them</a:t>
+            </a:r>
+          </a:p>
+          <a:p>
+            <a:pPr lvl="1"/>
+            <a:endParaRPr lang="en-US" dirty="0"/>
+          </a:p>
+          <a:p>
+            <a:r>
+              <a:rPr lang="en-US" dirty="0"/>
+              <a:t>Configure the default text editor</a:t>
+            </a:r>
+          </a:p>
+          <a:p>
+            <a:pPr marL="801688" indent="-3175">
+              <a:buNone/>
+            </a:pPr>
+            <a:r>
+              <a:rPr lang="en-US" sz="1600" dirty="0">
+                <a:latin typeface="Courier New" panose="02070309020205020404" pitchFamily="49" charset="0"/>
+                <a:cs typeface="Courier New" panose="02070309020205020404" pitchFamily="49" charset="0"/>
+              </a:rPr>
+              <a:t>$ git config --global core.editor emacs </a:t>
+            </a:r>
+          </a:p>
+          <a:p>
+            <a:pPr lvl="1"/>
+            <a:r>
+              <a:rPr lang="en-US" dirty="0"/>
+              <a:t>used when git needs you to type a message</a:t>
+            </a:r>
+          </a:p>
+          <a:p>
+            <a:pPr lvl="1"/>
+            <a:r>
+              <a:rPr lang="en-US" dirty="0"/>
+              <a:t>if not configured, git uses your system’s default editor</a:t>
+            </a:r>
+            <a:endParaRPr lang="en-US" i="0" dirty="0"/>
+          </a:p>
+          <a:p>
             <a:endParaRPr lang="en-US" i="0" dirty="0"/>
           </a:p>
         </p:txBody>
@@ -4086,7 +5189,7 @@
         </p:nvSpPr>
         <p:spPr>
           <a:xfrm>
-            <a:off x="9111" y="0"/>
+            <a:off x="0" y="140672"/>
             <a:ext cx="9144000" cy="589085"/>
           </a:xfrm>
         </p:spPr>
@@ -4098,15 +5201,20 @@
           <a:p>
             <a:r>
               <a:rPr lang="en-US" dirty="0"/>
-              <a:t>Using GitHub</a:t>
-            </a:r>
-            <a:endParaRPr lang="en-US" b="0" dirty="0"/>
-          </a:p>
-        </p:txBody>
-      </p:sp>
-      <p:sp>
-        <p:nvSpPr>
-          <p:cNvPr id="3" name="Content Placeholder 2"/>
+              <a:t>Class discussion:</a:t>
+            </a:r>
+          </a:p>
+        </p:txBody>
+      </p:sp>
+      <p:sp>
+        <p:nvSpPr>
+          <p:cNvPr id="6" name="Content Placeholder 2">
+            <a:extLst>
+              <a:ext uri="{FF2B5EF4-FFF2-40B4-BE49-F238E27FC236}">
+                <a16:creationId xmlns:a16="http://schemas.microsoft.com/office/drawing/2014/main" id="{9081FF26-7AD5-4767-AF65-A27F1769E1FC}"/>
+              </a:ext>
+            </a:extLst>
+          </p:cNvPr>
           <p:cNvSpPr>
             <a:spLocks noGrp="1"/>
           </p:cNvSpPr>
@@ -4116,8 +5224,8 @@
         </p:nvSpPr>
         <p:spPr>
           <a:xfrm>
-            <a:off x="276639" y="653144"/>
-            <a:ext cx="8608944" cy="5580508"/>
+            <a:off x="152400" y="827314"/>
+            <a:ext cx="8839200" cy="5364480"/>
           </a:xfrm>
         </p:spPr>
         <p:txBody>
@@ -4127,251 +5235,118 @@
           <a:lstStyle/>
           <a:p>
             <a:r>
-              <a:rPr lang="en-US" dirty="0"/>
-              <a:t>GitHub &amp; Bitbucket are two of the largest web-based hosting services</a:t>
-            </a:r>
-          </a:p>
-          <a:p>
-            <a:pPr lvl="1"/>
+              <a:rPr lang="en-US" sz="1800" i="0" dirty="0"/>
+              <a:t>Any questions at this point?</a:t>
+            </a:r>
+          </a:p>
+          <a:p>
+            <a:pPr lvl="1"/>
+            <a:endParaRPr lang="en-US" i="0" dirty="0"/>
+          </a:p>
+          <a:p>
+            <a:r>
+              <a:rPr lang="en-US" dirty="0"/>
+              <a:t>Any concerns about using git from the command line (CL)?</a:t>
+            </a:r>
+          </a:p>
+          <a:p>
+            <a:pPr lvl="1"/>
+            <a:r>
+              <a:rPr lang="en-US" i="0" dirty="0"/>
+              <a:t>git is a distributed VCS implementation</a:t>
+            </a:r>
+          </a:p>
+          <a:p>
+            <a:pPr lvl="1"/>
+            <a:r>
+              <a:rPr lang="en-US" i="0" dirty="0"/>
+              <a:t>the classroom computers provide git on </a:t>
+            </a:r>
+            <a:r>
+              <a:rPr lang="en-US" dirty="0"/>
+              <a:t>L</a:t>
+            </a:r>
+            <a:r>
+              <a:rPr lang="en-US" i="0" dirty="0"/>
+              <a:t>inux</a:t>
+            </a:r>
+          </a:p>
+          <a:p>
+            <a:pPr lvl="1"/>
+            <a:r>
+              <a:rPr lang="en-US" dirty="0"/>
+              <a:t>2 students per computer, but only one Linux login</a:t>
+            </a:r>
+          </a:p>
+          <a:p>
+            <a:pPr lvl="2"/>
+            <a:r>
+              <a:rPr lang="en-US" i="0" dirty="0"/>
+              <a:t>this means you’ll have to share a single git identity</a:t>
+            </a:r>
+          </a:p>
+          <a:p>
             <a:endParaRPr lang="en-US" dirty="0"/>
           </a:p>
           <a:p>
-            <a:pPr lvl="1"/>
-            <a:r>
-              <a:rPr lang="en-US" dirty="0"/>
-              <a:t>they are targeted towards software development projects</a:t>
+            <a:r>
+              <a:rPr lang="en-US" dirty="0"/>
+              <a:t>Work from your laptop…</a:t>
+            </a:r>
+          </a:p>
+          <a:p>
+            <a:pPr lvl="1"/>
+            <a:r>
+              <a:rPr lang="en-US" dirty="0"/>
+              <a:t>if it has a good CL environment, with git installed</a:t>
             </a:r>
           </a:p>
           <a:p>
             <a:pPr lvl="2"/>
-            <a:r>
-              <a:rPr lang="en-US" dirty="0"/>
-              <a:t>can be used for proposals, papers or any collection of documents</a:t>
-            </a:r>
-          </a:p>
-          <a:p>
-            <a:pPr lvl="1"/>
-            <a:r>
-              <a:rPr lang="en-US" dirty="0"/>
-              <a:t>neither supports Subversion (SVN)</a:t>
-            </a:r>
-          </a:p>
-          <a:p>
-            <a:pPr lvl="2"/>
-            <a:r>
-              <a:rPr lang="en-US" dirty="0"/>
-              <a:t>GitHub exclusively supports </a:t>
-            </a:r>
-            <a:r>
-              <a:rPr lang="en-US" b="0" dirty="0">
-                <a:solidFill>
-                  <a:schemeClr val="tx1"/>
-                </a:solidFill>
-                <a:latin typeface="Courier New" panose="02070309020205020404" pitchFamily="49" charset="0"/>
-                <a:cs typeface="Courier New" panose="02070309020205020404" pitchFamily="49" charset="0"/>
-              </a:rPr>
-              <a:t>git</a:t>
-            </a:r>
-            <a:r>
-              <a:rPr lang="en-US" dirty="0"/>
-              <a:t>;  Bitbucket supports </a:t>
-            </a:r>
-            <a:r>
-              <a:rPr lang="en-US" sz="1600" b="0" dirty="0">
-                <a:solidFill>
-                  <a:schemeClr val="tx1"/>
-                </a:solidFill>
-                <a:latin typeface="Courier New" panose="02070309020205020404" pitchFamily="49" charset="0"/>
-                <a:cs typeface="Courier New" panose="02070309020205020404" pitchFamily="49" charset="0"/>
-              </a:rPr>
-              <a:t>git</a:t>
-            </a:r>
-            <a:r>
-              <a:rPr lang="en-US" dirty="0"/>
-              <a:t> and </a:t>
-            </a:r>
-            <a:r>
-              <a:rPr lang="en-US" sz="1600" b="0" dirty="0">
-                <a:solidFill>
-                  <a:schemeClr val="tx1"/>
-                </a:solidFill>
-                <a:latin typeface="Courier New" panose="02070309020205020404" pitchFamily="49" charset="0"/>
-                <a:cs typeface="Courier New" panose="02070309020205020404" pitchFamily="49" charset="0"/>
-              </a:rPr>
-              <a:t>mercurial</a:t>
-            </a:r>
-            <a:endParaRPr lang="en-US" b="0" dirty="0">
-              <a:solidFill>
-                <a:schemeClr val="tx1"/>
-              </a:solidFill>
-              <a:latin typeface="Courier New" panose="02070309020205020404" pitchFamily="49" charset="0"/>
-              <a:cs typeface="Courier New" panose="02070309020205020404" pitchFamily="49" charset="0"/>
-            </a:endParaRPr>
-          </a:p>
-          <a:p>
-            <a:r>
-              <a:rPr lang="en-US" dirty="0"/>
-              <a:t>GitHub provides the following features (and more):</a:t>
-            </a:r>
-          </a:p>
-          <a:p>
-            <a:pPr lvl="1"/>
-            <a:r>
-              <a:rPr lang="en-US" dirty="0"/>
-              <a:t>an integrated issue tracker</a:t>
-            </a:r>
-          </a:p>
-          <a:p>
-            <a:pPr lvl="1"/>
-            <a:r>
-              <a:rPr lang="en-US" dirty="0"/>
-              <a:t>branch comparison views</a:t>
-            </a:r>
-          </a:p>
-          <a:p>
-            <a:pPr lvl="1"/>
-            <a:r>
-              <a:rPr lang="en-US" dirty="0"/>
-              <a:t>native applications for Windows and Mac desktops</a:t>
-            </a:r>
-          </a:p>
-          <a:p>
-            <a:pPr lvl="2"/>
-            <a:r>
-              <a:rPr lang="en-US" dirty="0"/>
-              <a:t>https://desktop.github.com/</a:t>
-            </a:r>
-          </a:p>
-          <a:p>
-            <a:pPr lvl="1"/>
-            <a:r>
-              <a:rPr lang="en-US" dirty="0"/>
-              <a:t>support for over 200 programming languages and data formats</a:t>
-            </a:r>
-          </a:p>
-          <a:p>
-            <a:pPr lvl="1"/>
-            <a:r>
-              <a:rPr lang="en-US" dirty="0"/>
-              <a:t>GitHub pages, a feature for publishing and hosting</a:t>
-            </a:r>
-          </a:p>
-          <a:p>
-            <a:pPr lvl="1"/>
-            <a:r>
-              <a:rPr lang="en-US" dirty="0"/>
-              <a:t>SSL, SSH &amp; https for data transmission;  two-factor authentication for login</a:t>
-            </a:r>
-          </a:p>
-          <a:p>
-            <a:pPr lvl="1"/>
-            <a:r>
-              <a:rPr lang="en-US" dirty="0"/>
-              <a:t>API integration for 3</a:t>
-            </a:r>
-            <a:r>
-              <a:rPr lang="en-US" baseline="30000" dirty="0"/>
-              <a:t>rd</a:t>
-            </a:r>
-            <a:r>
-              <a:rPr lang="en-US" dirty="0"/>
-              <a:t>-party tool and other platforms</a:t>
-            </a:r>
-          </a:p>
-          <a:p>
-            <a:pPr lvl="1"/>
-            <a:r>
-              <a:rPr lang="en-US" dirty="0"/>
-              <a:t>partial support is provided for </a:t>
-            </a:r>
-            <a:r>
-              <a:rPr lang="en-US" sz="1800" dirty="0">
-                <a:solidFill>
-                  <a:schemeClr val="tx1"/>
-                </a:solidFill>
-                <a:latin typeface="Courier New" panose="02070309020205020404" pitchFamily="49" charset="0"/>
-                <a:cs typeface="Courier New" panose="02070309020205020404" pitchFamily="49" charset="0"/>
-              </a:rPr>
-              <a:t>SVN</a:t>
-            </a:r>
-            <a:endParaRPr lang="en-US" dirty="0">
-              <a:solidFill>
-                <a:schemeClr val="tx1"/>
-              </a:solidFill>
-              <a:latin typeface="Courier New" panose="02070309020205020404" pitchFamily="49" charset="0"/>
-              <a:cs typeface="Courier New" panose="02070309020205020404" pitchFamily="49" charset="0"/>
-            </a:endParaRPr>
-          </a:p>
-          <a:p>
-            <a:pPr lvl="2"/>
-            <a:r>
-              <a:rPr lang="en-US" dirty="0"/>
-              <a:t>import SVN repos into git</a:t>
-            </a:r>
-          </a:p>
-          <a:p>
-            <a:pPr lvl="2"/>
-            <a:r>
-              <a:rPr lang="en-US" dirty="0"/>
-              <a:t>GitHub repos can be cloned directly via the SVN client.</a:t>
-            </a:r>
-          </a:p>
-        </p:txBody>
-      </p:sp>
-      <p:sp>
-        <p:nvSpPr>
-          <p:cNvPr id="4" name="TextBox 3">
-            <a:extLst>
-              <a:ext uri="{FF2B5EF4-FFF2-40B4-BE49-F238E27FC236}">
-                <a16:creationId xmlns:a16="http://schemas.microsoft.com/office/drawing/2014/main" id="{97DE75EA-783B-4A37-9C7A-39FAED9F70AD}"/>
-              </a:ext>
-            </a:extLst>
-          </p:cNvPr>
-          <p:cNvSpPr txBox="1"/>
-          <p:nvPr/>
-        </p:nvSpPr>
-        <p:spPr>
-          <a:xfrm>
-            <a:off x="2540063" y="968229"/>
-            <a:ext cx="6603937" cy="338554"/>
-          </a:xfrm>
-          <a:prstGeom prst="rect">
-            <a:avLst/>
-          </a:prstGeom>
-          <a:noFill/>
-        </p:spPr>
-        <p:txBody>
-          <a:bodyPr wrap="square" rtlCol="0">
-            <a:spAutoFit/>
-          </a:bodyPr>
-          <a:lstStyle/>
-          <a:p>
-            <a:pPr marL="227013" indent="-227013">
-              <a:spcBef>
-                <a:spcPts val="300"/>
-              </a:spcBef>
-            </a:pPr>
-            <a:r>
-              <a:rPr lang="en-US" sz="1600" dirty="0">
-                <a:latin typeface="Times New Roman" panose="02020603050405020304" pitchFamily="18" charset="0"/>
-                <a:cs typeface="Times New Roman" panose="02020603050405020304" pitchFamily="18" charset="0"/>
-              </a:rPr>
-              <a:t>for a comparison, see  </a:t>
-            </a:r>
-            <a:r>
-              <a:rPr lang="en-US" sz="1600" dirty="0">
-                <a:latin typeface="Times New Roman" panose="02020603050405020304" pitchFamily="18" charset="0"/>
-                <a:cs typeface="Times New Roman" panose="02020603050405020304" pitchFamily="18" charset="0"/>
+            <a:endParaRPr lang="en-US" dirty="0"/>
+          </a:p>
+          <a:p>
+            <a:r>
+              <a:rPr lang="en-US" dirty="0"/>
+              <a:t>You can download/install the GitHub desktop application</a:t>
+            </a:r>
+          </a:p>
+          <a:p>
+            <a:pPr lvl="1"/>
+            <a:r>
+              <a:rPr lang="en-US" dirty="0">
                 <a:hlinkClick r:id="rId3"/>
               </a:rPr>
-              <a:t>https://www.upguard.com/articles/github-vs-bitbucket</a:t>
-            </a:r>
-            <a:r>
-              <a:rPr lang="en-US" sz="1600" dirty="0">
-                <a:latin typeface="Times New Roman" panose="02020603050405020304" pitchFamily="18" charset="0"/>
-                <a:cs typeface="Times New Roman" panose="02020603050405020304" pitchFamily="18" charset="0"/>
-              </a:rPr>
-              <a:t>  </a:t>
+              <a:t>https://desktop.github.com</a:t>
+            </a:r>
+            <a:r>
+              <a:rPr lang="en-US" dirty="0"/>
+              <a:t> </a:t>
+            </a:r>
+            <a:endParaRPr lang="en-US" i="0" dirty="0"/>
+          </a:p>
+          <a:p>
+            <a:pPr lvl="1"/>
+            <a:r>
+              <a:rPr lang="en-US" dirty="0"/>
+              <a:t>it installs git on your Windows or MacOS laptop</a:t>
+            </a:r>
+          </a:p>
+          <a:p>
+            <a:pPr lvl="1"/>
+            <a:r>
+              <a:rPr lang="en-US" i="0" dirty="0"/>
+              <a:t>it provides an optional command-line terminal for using git</a:t>
+            </a:r>
+          </a:p>
+          <a:p>
+            <a:pPr lvl="1"/>
+            <a:endParaRPr lang="en-US" dirty="0"/>
+          </a:p>
+          <a:p>
+            <a:r>
+              <a:rPr lang="en-US" i="0" dirty="0"/>
+              <a:t>Today’s computer lab exercises will provide some practical experience</a:t>
             </a:r>
           </a:p>
         </p:txBody>
@@ -4379,7 +5354,7 @@
     </p:spTree>
     <p:extLst>
       <p:ext uri="{BB962C8B-B14F-4D97-AF65-F5344CB8AC3E}">
-        <p14:creationId xmlns:p14="http://schemas.microsoft.com/office/powerpoint/2010/main" val="2274151764"/>
+        <p14:creationId xmlns:p14="http://schemas.microsoft.com/office/powerpoint/2010/main" val="2070114419"/>
       </p:ext>
     </p:extLst>
   </p:cSld>
@@ -4406,12 +5381,268 @@
           <a:chExt cx="0" cy="0"/>
         </a:xfrm>
       </p:grpSpPr>
+      <p:sp>
+        <p:nvSpPr>
+          <p:cNvPr id="2" name="Title 1"/>
+          <p:cNvSpPr>
+            <a:spLocks noGrp="1"/>
+          </p:cNvSpPr>
+          <p:nvPr>
+            <p:ph type="title"/>
+          </p:nvPr>
+        </p:nvSpPr>
+        <p:spPr>
+          <a:xfrm>
+            <a:off x="9111" y="-7374"/>
+            <a:ext cx="9144000" cy="589085"/>
+          </a:xfrm>
+        </p:spPr>
+        <p:txBody>
+          <a:bodyPr>
+            <a:normAutofit/>
+          </a:bodyPr>
+          <a:lstStyle/>
+          <a:p>
+            <a:r>
+              <a:rPr lang="en-US" dirty="0"/>
+              <a:t>git – Underlying Concepts</a:t>
+            </a:r>
+            <a:r>
+              <a:rPr lang="en-US" b="0" dirty="0"/>
+              <a:t> (Part 1)</a:t>
+            </a:r>
+          </a:p>
+        </p:txBody>
+      </p:sp>
+      <p:sp>
+        <p:nvSpPr>
+          <p:cNvPr id="3" name="Content Placeholder 2"/>
+          <p:cNvSpPr>
+            <a:spLocks noGrp="1"/>
+          </p:cNvSpPr>
+          <p:nvPr>
+            <p:ph idx="1"/>
+          </p:nvPr>
+        </p:nvSpPr>
+        <p:spPr>
+          <a:xfrm>
+            <a:off x="276639" y="644434"/>
+            <a:ext cx="8608944" cy="5773783"/>
+          </a:xfrm>
+        </p:spPr>
+        <p:txBody>
+          <a:bodyPr>
+            <a:normAutofit fontScale="92500" lnSpcReduction="20000"/>
+          </a:bodyPr>
+          <a:lstStyle/>
+          <a:p>
+            <a:r>
+              <a:rPr lang="en-US" dirty="0"/>
+              <a:t>The git CLI is not intuitive, compared to central model applications (e.g. </a:t>
+            </a:r>
+            <a:r>
+              <a:rPr lang="en-US" dirty="0" err="1"/>
+              <a:t>svn</a:t>
+            </a:r>
+            <a:r>
+              <a:rPr lang="en-US" dirty="0"/>
+              <a:t>)</a:t>
+            </a:r>
+          </a:p>
+          <a:p>
+            <a:pPr lvl="1"/>
+            <a:r>
+              <a:rPr lang="en-US" dirty="0"/>
+              <a:t>it helps if you understand the underlying concepts</a:t>
+            </a:r>
+          </a:p>
+          <a:p>
+            <a:r>
+              <a:rPr lang="en-US" dirty="0"/>
+              <a:t>The git commit tree</a:t>
+            </a:r>
+          </a:p>
+          <a:p>
+            <a:pPr lvl="1"/>
+            <a:r>
+              <a:rPr lang="en-US" dirty="0"/>
+              <a:t>information stored within a git repository is representable as a graph</a:t>
+            </a:r>
+          </a:p>
+          <a:p>
+            <a:pPr lvl="2"/>
+            <a:r>
+              <a:rPr lang="en-US" dirty="0"/>
+              <a:t>each node results from an operation</a:t>
+            </a:r>
+          </a:p>
+          <a:p>
+            <a:pPr lvl="2"/>
+            <a:r>
+              <a:rPr lang="en-US" dirty="0"/>
+              <a:t>database is immutable and append-only</a:t>
+            </a:r>
+          </a:p>
+          <a:p>
+            <a:pPr lvl="2"/>
+            <a:endParaRPr lang="en-US" dirty="0"/>
+          </a:p>
+          <a:p>
+            <a:r>
+              <a:rPr lang="en-US" dirty="0"/>
+              <a:t>an example git Tree (see figure)</a:t>
+            </a:r>
+          </a:p>
+          <a:p>
+            <a:pPr lvl="1"/>
+            <a:r>
+              <a:rPr lang="en-US" dirty="0"/>
+              <a:t>each node is associated with…</a:t>
+            </a:r>
+          </a:p>
+          <a:p>
+            <a:pPr lvl="2"/>
+            <a:r>
+              <a:rPr lang="en-US" dirty="0"/>
+              <a:t>the developer’s commit message</a:t>
+            </a:r>
+          </a:p>
+          <a:p>
+            <a:pPr lvl="2"/>
+            <a:r>
+              <a:rPr lang="en-US" dirty="0"/>
+              <a:t>a unique hash </a:t>
+            </a:r>
+            <a:r>
+              <a:rPr lang="en-US" b="0" dirty="0">
+                <a:solidFill>
+                  <a:schemeClr val="tx1"/>
+                </a:solidFill>
+              </a:rPr>
+              <a:t>(</a:t>
+            </a:r>
+            <a:r>
+              <a:rPr lang="en-US" b="0" dirty="0">
+                <a:solidFill>
+                  <a:schemeClr val="tx1"/>
+                </a:solidFill>
+                <a:latin typeface="Courier New" panose="02070309020205020404" pitchFamily="49" charset="0"/>
+                <a:cs typeface="Courier New" panose="02070309020205020404" pitchFamily="49" charset="0"/>
+              </a:rPr>
+              <a:t>guid</a:t>
+            </a:r>
+            <a:r>
+              <a:rPr lang="en-US" b="0" dirty="0">
+                <a:solidFill>
+                  <a:schemeClr val="tx1"/>
+                </a:solidFill>
+              </a:rPr>
+              <a:t>)</a:t>
+            </a:r>
+          </a:p>
+          <a:p>
+            <a:pPr lvl="2"/>
+            <a:endParaRPr lang="en-US" dirty="0"/>
+          </a:p>
+          <a:p>
+            <a:pPr lvl="2"/>
+            <a:endParaRPr lang="en-US" dirty="0"/>
+          </a:p>
+          <a:p>
+            <a:pPr lvl="2"/>
+            <a:endParaRPr lang="en-US" dirty="0"/>
+          </a:p>
+          <a:p>
+            <a:pPr lvl="2"/>
+            <a:endParaRPr lang="en-US" dirty="0"/>
+          </a:p>
+          <a:p>
+            <a:r>
+              <a:rPr lang="en-US" dirty="0"/>
+              <a:t>Git references</a:t>
+            </a:r>
+          </a:p>
+          <a:p>
+            <a:pPr lvl="1"/>
+            <a:r>
+              <a:rPr lang="en-US" dirty="0"/>
+              <a:t>a reference (ref) is a human readable label, pointing to a commit hash</a:t>
+            </a:r>
+          </a:p>
+          <a:p>
+            <a:pPr lvl="2"/>
+            <a:r>
+              <a:rPr lang="en-US" dirty="0"/>
+              <a:t>branches, tags, remotes are all forms of refs</a:t>
+            </a:r>
+          </a:p>
+          <a:p>
+            <a:pPr lvl="2"/>
+            <a:r>
+              <a:rPr lang="en-US" dirty="0"/>
+              <a:t>refs facilitate interaction with the commit tree</a:t>
+            </a:r>
+          </a:p>
+          <a:p>
+            <a:pPr lvl="1"/>
+            <a:r>
+              <a:rPr lang="en-US" dirty="0"/>
+              <a:t>refs do not hold the information in the git database</a:t>
+            </a:r>
+          </a:p>
+          <a:p>
+            <a:pPr lvl="2"/>
+            <a:r>
+              <a:rPr lang="en-US" dirty="0"/>
+              <a:t>all such info is held within the commit tree, which is immutable</a:t>
+            </a:r>
+          </a:p>
+          <a:p>
+            <a:pPr lvl="1"/>
+            <a:r>
+              <a:rPr lang="en-US" dirty="0"/>
+              <a:t>suppose the git repository is in a bad state, and we want to back track</a:t>
+            </a:r>
+          </a:p>
+          <a:p>
+            <a:pPr lvl="2"/>
+            <a:r>
+              <a:rPr lang="en-US" dirty="0"/>
+              <a:t>all previous states are still present inside the tree</a:t>
+            </a:r>
+          </a:p>
+          <a:p>
+            <a:pPr lvl="2"/>
+            <a:r>
+              <a:rPr lang="en-US" dirty="0"/>
+              <a:t>we need only change the references to the desired commit address</a:t>
+            </a:r>
+          </a:p>
+          <a:p>
+            <a:pPr lvl="1"/>
+            <a:r>
+              <a:rPr lang="en-US" dirty="0"/>
+              <a:t>git provides a special reference named HEAD</a:t>
+            </a:r>
+          </a:p>
+          <a:p>
+            <a:pPr lvl="2"/>
+            <a:r>
+              <a:rPr lang="en-US" dirty="0"/>
+              <a:t>current address for the state that is checked out in the working directory</a:t>
+            </a:r>
+          </a:p>
+          <a:p>
+            <a:endParaRPr lang="en-US" i="0" dirty="0"/>
+          </a:p>
+        </p:txBody>
+      </p:sp>
       <p:pic>
         <p:nvPicPr>
-          <p:cNvPr id="8" name="Picture 7">
+          <p:cNvPr id="5" name="Picture 4">
             <a:extLst>
               <a:ext uri="{FF2B5EF4-FFF2-40B4-BE49-F238E27FC236}">
-                <a16:creationId xmlns:a16="http://schemas.microsoft.com/office/drawing/2014/main" id="{683A3D10-4CC3-48CB-905D-DF3F31119B55}"/>
+                <a16:creationId xmlns:a16="http://schemas.microsoft.com/office/drawing/2014/main" id="{B1666F0E-DAAD-4B1A-9779-5F3CBDF6A082}"/>
               </a:ext>
             </a:extLst>
           </p:cNvPr>
@@ -4420,83 +5651,26 @@
           </p:cNvPicPr>
           <p:nvPr/>
         </p:nvPicPr>
-        <p:blipFill rotWithShape="1">
+        <p:blipFill>
           <a:blip r:embed="rId3"/>
-          <a:srcRect b="13104"/>
-          <a:stretch/>
+          <a:stretch>
+            <a:fillRect/>
+          </a:stretch>
         </p:blipFill>
         <p:spPr>
           <a:xfrm>
-            <a:off x="223601" y="16728"/>
-            <a:ext cx="7753450" cy="5610072"/>
+            <a:off x="5155475" y="1738921"/>
+            <a:ext cx="3629432" cy="2339760"/>
           </a:xfrm>
           <a:prstGeom prst="rect">
             <a:avLst/>
           </a:prstGeom>
         </p:spPr>
       </p:pic>
-      <p:sp>
-        <p:nvSpPr>
-          <p:cNvPr id="3" name="TextBox 2">
-            <a:extLst>
-              <a:ext uri="{FF2B5EF4-FFF2-40B4-BE49-F238E27FC236}">
-                <a16:creationId xmlns:a16="http://schemas.microsoft.com/office/drawing/2014/main" id="{F79BAF6B-CF2F-4C8F-9A35-532D9626EBA2}"/>
-              </a:ext>
-            </a:extLst>
-          </p:cNvPr>
-          <p:cNvSpPr txBox="1"/>
-          <p:nvPr/>
-        </p:nvSpPr>
-        <p:spPr>
-          <a:xfrm>
-            <a:off x="1475935" y="5872161"/>
-            <a:ext cx="7668065" cy="338554"/>
-          </a:xfrm>
-          <a:prstGeom prst="rect">
-            <a:avLst/>
-          </a:prstGeom>
-          <a:noFill/>
-        </p:spPr>
-        <p:txBody>
-          <a:bodyPr wrap="square" rtlCol="0">
-            <a:spAutoFit/>
-          </a:bodyPr>
-          <a:lstStyle/>
-          <a:p>
-            <a:pPr marL="227013" indent="-227013">
-              <a:spcBef>
-                <a:spcPts val="300"/>
-              </a:spcBef>
-            </a:pPr>
-            <a:r>
-              <a:rPr lang="en-US" sz="1600" dirty="0">
-                <a:latin typeface="Times New Roman" panose="02020603050405020304" pitchFamily="18" charset="0"/>
-                <a:cs typeface="Times New Roman" panose="02020603050405020304" pitchFamily="18" charset="0"/>
-              </a:rPr>
-              <a:t>Go to GitHub docs for interactive explanation, </a:t>
-            </a:r>
-            <a:r>
-              <a:rPr lang="en-US" sz="1600" dirty="0">
-                <a:latin typeface="Times New Roman" panose="02020603050405020304" pitchFamily="18" charset="0"/>
-                <a:cs typeface="Times New Roman" panose="02020603050405020304" pitchFamily="18" charset="0"/>
-                <a:hlinkClick r:id="rId4"/>
-              </a:rPr>
-              <a:t>https://guides.github.com/introduction/flow</a:t>
-            </a:r>
-            <a:r>
-              <a:rPr lang="en-US" sz="1600" dirty="0">
-                <a:latin typeface="Times New Roman" panose="02020603050405020304" pitchFamily="18" charset="0"/>
-                <a:cs typeface="Times New Roman" panose="02020603050405020304" pitchFamily="18" charset="0"/>
-              </a:rPr>
-              <a:t> </a:t>
-            </a:r>
-          </a:p>
-        </p:txBody>
-      </p:sp>
     </p:spTree>
     <p:extLst>
       <p:ext uri="{BB962C8B-B14F-4D97-AF65-F5344CB8AC3E}">
-        <p14:creationId xmlns:p14="http://schemas.microsoft.com/office/powerpoint/2010/main" val="2040364059"/>
+        <p14:creationId xmlns:p14="http://schemas.microsoft.com/office/powerpoint/2010/main" val="661511705"/>
       </p:ext>
     </p:extLst>
   </p:cSld>
@@ -4535,7 +5709,7 @@
         </p:nvSpPr>
         <p:spPr>
           <a:xfrm>
-            <a:off x="0" y="140672"/>
+            <a:off x="0" y="10037"/>
             <a:ext cx="9144000" cy="589085"/>
           </a:xfrm>
         </p:spPr>
@@ -4547,7 +5721,11 @@
           <a:p>
             <a:r>
               <a:rPr lang="en-US" dirty="0"/>
-              <a:t>Using git via GitHub</a:t>
+              <a:t>git – Underlying Concepts</a:t>
+            </a:r>
+            <a:r>
+              <a:rPr lang="en-US" b="0" dirty="0"/>
+              <a:t> (Part 2)</a:t>
             </a:r>
           </a:p>
         </p:txBody>
@@ -4564,8 +5742,8 @@
         </p:nvSpPr>
         <p:spPr>
           <a:xfrm>
-            <a:off x="276639" y="791300"/>
-            <a:ext cx="8608944" cy="850687"/>
+            <a:off x="276639" y="599123"/>
+            <a:ext cx="8608944" cy="5801672"/>
           </a:xfrm>
         </p:spPr>
         <p:txBody>
@@ -4576,178 +5754,254 @@
           <a:p>
             <a:r>
               <a:rPr lang="en-US" dirty="0"/>
-              <a:t>TBD…</a:t>
+              <a:t>The state of a git repository has three components</a:t>
+            </a:r>
+          </a:p>
+          <a:p>
+            <a:pPr lvl="1"/>
+            <a:r>
+              <a:rPr lang="en-US" dirty="0"/>
+              <a:t>Working Directory</a:t>
+            </a:r>
+          </a:p>
+          <a:p>
+            <a:pPr lvl="2"/>
+            <a:r>
+              <a:rPr lang="en-US" dirty="0"/>
+              <a:t>result of cloning a git repository </a:t>
+            </a:r>
+          </a:p>
+          <a:p>
+            <a:pPr lvl="2"/>
+            <a:r>
+              <a:rPr lang="en-US" dirty="0"/>
+              <a:t>a directory with everything contained within the git repository</a:t>
+            </a:r>
+          </a:p>
+          <a:p>
+            <a:pPr lvl="1"/>
+            <a:r>
+              <a:rPr lang="en-US" dirty="0"/>
+              <a:t>Staging Index</a:t>
+            </a:r>
+          </a:p>
+          <a:p>
+            <a:pPr lvl="2"/>
+            <a:r>
+              <a:rPr lang="en-US" dirty="0"/>
+              <a:t>an intermediate space to add changes from the working directory</a:t>
+            </a:r>
+          </a:p>
+          <a:p>
+            <a:pPr lvl="2"/>
+            <a:r>
+              <a:rPr lang="en-US" dirty="0"/>
+              <a:t>(without adding them to the commit tree)</a:t>
+            </a:r>
+          </a:p>
+          <a:p>
+            <a:pPr lvl="1"/>
+            <a:r>
+              <a:rPr lang="en-US" dirty="0"/>
+              <a:t>Commit Tree</a:t>
+            </a:r>
+          </a:p>
+          <a:p>
+            <a:pPr lvl="2"/>
+            <a:r>
+              <a:rPr lang="en-US" dirty="0"/>
+              <a:t>changes in the staging index are (when ready) added to the commit tree</a:t>
+            </a:r>
+          </a:p>
+          <a:p>
+            <a:pPr lvl="2"/>
+            <a:r>
+              <a:rPr lang="en-US" dirty="0"/>
+              <a:t>each change is given a hash address</a:t>
             </a:r>
             <a:endParaRPr lang="en-US" i="0" dirty="0"/>
           </a:p>
-        </p:txBody>
-      </p:sp>
-      <p:grpSp>
-        <p:nvGrpSpPr>
-          <p:cNvPr id="7" name="Group 6">
+          <a:p>
+            <a:r>
+              <a:rPr lang="en-US" i="0" dirty="0"/>
+              <a:t>Cloning a repository</a:t>
+            </a:r>
+          </a:p>
+          <a:p>
+            <a:pPr lvl="1"/>
+            <a:r>
+              <a:rPr lang="en-US" dirty="0"/>
+              <a:t>Create a local copy</a:t>
+            </a:r>
+          </a:p>
+          <a:p>
+            <a:pPr lvl="2"/>
+            <a:r>
+              <a:rPr lang="en-US" dirty="0"/>
+              <a:t>this is complete and independent from the source</a:t>
+            </a:r>
+          </a:p>
+          <a:p>
+            <a:pPr lvl="1"/>
+            <a:r>
+              <a:rPr lang="en-US" dirty="0"/>
+              <a:t>git supports various protocols:</a:t>
+            </a:r>
+          </a:p>
+          <a:p>
+            <a:pPr marL="801688" lvl="1" indent="0">
+              <a:buNone/>
+            </a:pPr>
+            <a:r>
+              <a:rPr lang="en-US" dirty="0">
+                <a:solidFill>
+                  <a:schemeClr val="tx1"/>
+                </a:solidFill>
+                <a:latin typeface="Courier New" panose="02070309020205020404" pitchFamily="49" charset="0"/>
+                <a:cs typeface="Courier New" panose="02070309020205020404" pitchFamily="49" charset="0"/>
+              </a:rPr>
+              <a:t>$ git clone [&lt;options&gt;] &lt;repo&gt; [&lt;dir&gt;]</a:t>
+            </a:r>
+          </a:p>
+          <a:p>
+            <a:pPr lvl="2"/>
+            <a:r>
+              <a:rPr lang="en-US" dirty="0"/>
+              <a:t>If no </a:t>
+            </a:r>
+            <a:r>
+              <a:rPr lang="en-US" dirty="0">
+                <a:solidFill>
+                  <a:schemeClr val="tx1"/>
+                </a:solidFill>
+              </a:rPr>
+              <a:t>[&lt;dir&gt;]</a:t>
+            </a:r>
+            <a:r>
+              <a:rPr lang="en-US" dirty="0"/>
+              <a:t>, git creates a new directory with the same name as the repo</a:t>
+            </a:r>
+          </a:p>
+          <a:p>
+            <a:pPr lvl="1"/>
+            <a:r>
+              <a:rPr lang="en-US" dirty="0"/>
+              <a:t>local filesystem clone</a:t>
+            </a:r>
+          </a:p>
+          <a:p>
+            <a:pPr marL="801688" lvl="1" indent="0">
+              <a:buNone/>
+            </a:pPr>
+            <a:r>
+              <a:rPr lang="en-US" dirty="0">
+                <a:solidFill>
+                  <a:schemeClr val="tx1"/>
+                </a:solidFill>
+                <a:latin typeface="Courier New" panose="02070309020205020404" pitchFamily="49" charset="0"/>
+                <a:cs typeface="Courier New" panose="02070309020205020404" pitchFamily="49" charset="0"/>
+              </a:rPr>
+              <a:t>$ git clone /Path/To/Git/Repo/Dir</a:t>
+            </a:r>
+          </a:p>
+          <a:p>
+            <a:pPr lvl="1"/>
+            <a:r>
+              <a:rPr lang="en-US" dirty="0"/>
+              <a:t>remote HTTPS clone from GitHub</a:t>
+            </a:r>
+          </a:p>
+          <a:p>
+            <a:pPr marL="801688" lvl="1" indent="0">
+              <a:buNone/>
+            </a:pPr>
+            <a:r>
+              <a:rPr lang="en-US" dirty="0">
+                <a:solidFill>
+                  <a:schemeClr val="tx1"/>
+                </a:solidFill>
+                <a:latin typeface="Courier New" panose="02070309020205020404" pitchFamily="49" charset="0"/>
+                <a:cs typeface="Courier New" panose="02070309020205020404" pitchFamily="49" charset="0"/>
+              </a:rPr>
+              <a:t>$ git clone https://github.com/radiasoft/devops.git</a:t>
+            </a:r>
+            <a:endParaRPr lang="en-US" i="0" dirty="0">
+              <a:solidFill>
+                <a:schemeClr val="tx1"/>
+              </a:solidFill>
+              <a:latin typeface="Courier New" panose="02070309020205020404" pitchFamily="49" charset="0"/>
+              <a:cs typeface="Courier New" panose="02070309020205020404" pitchFamily="49" charset="0"/>
+            </a:endParaRPr>
+          </a:p>
+        </p:txBody>
+      </p:sp>
+      <p:sp>
+        <p:nvSpPr>
+          <p:cNvPr id="6" name="TextBox 5">
             <a:extLst>
               <a:ext uri="{FF2B5EF4-FFF2-40B4-BE49-F238E27FC236}">
-                <a16:creationId xmlns:a16="http://schemas.microsoft.com/office/drawing/2014/main" id="{5F3B2A9D-A095-4E5D-A138-DF824E0B49A2}"/>
+                <a16:creationId xmlns:a16="http://schemas.microsoft.com/office/drawing/2014/main" id="{3E3C4FE5-CE52-49D0-8D71-D49791CF4F21}"/>
               </a:ext>
             </a:extLst>
           </p:cNvPr>
-          <p:cNvGrpSpPr/>
+          <p:cNvSpPr txBox="1"/>
           <p:nvPr/>
-        </p:nvGrpSpPr>
-        <p:grpSpPr>
+        </p:nvSpPr>
+        <p:spPr>
           <a:xfrm>
-            <a:off x="1061879" y="1924575"/>
-            <a:ext cx="7990848" cy="4212660"/>
-            <a:chOff x="894735" y="1491947"/>
-            <a:chExt cx="7990848" cy="4212660"/>
+            <a:off x="4561872" y="3461619"/>
+            <a:ext cx="4172825" cy="307777"/>
           </a:xfrm>
-        </p:grpSpPr>
-        <p:pic>
-          <p:nvPicPr>
-            <p:cNvPr id="4" name="Picture 3">
-              <a:extLst>
-                <a:ext uri="{FF2B5EF4-FFF2-40B4-BE49-F238E27FC236}">
-                  <a16:creationId xmlns:a16="http://schemas.microsoft.com/office/drawing/2014/main" id="{E5AFA05D-B9C5-49D6-98E5-D5C9D34113C1}"/>
-                </a:ext>
-              </a:extLst>
-            </p:cNvPr>
-            <p:cNvPicPr>
-              <a:picLocks noChangeAspect="1"/>
-            </p:cNvPicPr>
-            <p:nvPr/>
-          </p:nvPicPr>
-          <p:blipFill rotWithShape="1">
-            <a:blip r:embed="rId3"/>
-            <a:srcRect l="7096" t="19383" r="7419" b="1653"/>
-            <a:stretch/>
-          </p:blipFill>
-          <p:spPr>
-            <a:xfrm>
-              <a:off x="894735" y="1491947"/>
-              <a:ext cx="7816646" cy="3874106"/>
-            </a:xfrm>
-            <a:prstGeom prst="rect">
-              <a:avLst/>
-            </a:prstGeom>
-          </p:spPr>
-        </p:pic>
-        <p:sp>
-          <p:nvSpPr>
-            <p:cNvPr id="5" name="TextBox 4">
-              <a:extLst>
-                <a:ext uri="{FF2B5EF4-FFF2-40B4-BE49-F238E27FC236}">
-                  <a16:creationId xmlns:a16="http://schemas.microsoft.com/office/drawing/2014/main" id="{3F2CA186-0F6F-4A38-82D8-764F1ED43139}"/>
-                </a:ext>
-              </a:extLst>
-            </p:cNvPr>
-            <p:cNvSpPr txBox="1"/>
-            <p:nvPr/>
-          </p:nvSpPr>
-          <p:spPr>
-            <a:xfrm>
-              <a:off x="3726430" y="5366053"/>
-              <a:ext cx="5159153" cy="338554"/>
-            </a:xfrm>
-            <a:prstGeom prst="rect">
-              <a:avLst/>
-            </a:prstGeom>
-            <a:noFill/>
-          </p:spPr>
-          <p:txBody>
-            <a:bodyPr wrap="square" rtlCol="0">
-              <a:spAutoFit/>
-            </a:bodyPr>
-            <a:lstStyle/>
-            <a:p>
-              <a:pPr marL="227013" indent="-227013">
-                <a:spcBef>
-                  <a:spcPts val="300"/>
-                </a:spcBef>
-              </a:pPr>
-              <a:r>
-                <a:rPr lang="en-US" sz="1600" dirty="0">
-                  <a:latin typeface="Times New Roman" panose="02020603050405020304" pitchFamily="18" charset="0"/>
-                  <a:cs typeface="Times New Roman" panose="02020603050405020304" pitchFamily="18" charset="0"/>
-                </a:rPr>
-                <a:t>GitHub docs, </a:t>
-              </a:r>
-              <a:r>
-                <a:rPr lang="en-US" sz="1600" dirty="0">
-                  <a:latin typeface="Times New Roman" panose="02020603050405020304" pitchFamily="18" charset="0"/>
-                  <a:cs typeface="Times New Roman" panose="02020603050405020304" pitchFamily="18" charset="0"/>
-                  <a:hlinkClick r:id="rId4"/>
-                </a:rPr>
-                <a:t>https://guides.github.com/introduction/flow</a:t>
-              </a:r>
-              <a:r>
-                <a:rPr lang="en-US" sz="1600" dirty="0">
-                  <a:latin typeface="Times New Roman" panose="02020603050405020304" pitchFamily="18" charset="0"/>
-                  <a:cs typeface="Times New Roman" panose="02020603050405020304" pitchFamily="18" charset="0"/>
-                </a:rPr>
-                <a:t> </a:t>
-              </a:r>
-            </a:p>
-          </p:txBody>
-        </p:sp>
-        <p:sp>
-          <p:nvSpPr>
-            <p:cNvPr id="6" name="Rectangle 5">
-              <a:extLst>
-                <a:ext uri="{FF2B5EF4-FFF2-40B4-BE49-F238E27FC236}">
-                  <a16:creationId xmlns:a16="http://schemas.microsoft.com/office/drawing/2014/main" id="{705E7EBB-B044-44DC-A638-68FE5F7FB454}"/>
-                </a:ext>
-              </a:extLst>
-            </p:cNvPr>
-            <p:cNvSpPr/>
-            <p:nvPr/>
-          </p:nvSpPr>
-          <p:spPr>
-            <a:xfrm>
-              <a:off x="1170040" y="4640827"/>
-              <a:ext cx="570271" cy="216310"/>
-            </a:xfrm>
-            <a:prstGeom prst="rect">
-              <a:avLst/>
-            </a:prstGeom>
+          <a:prstGeom prst="rect">
+            <a:avLst/>
+          </a:prstGeom>
+          <a:noFill/>
+          <a:ln>
             <a:solidFill>
-              <a:schemeClr val="bg1"/>
+              <a:schemeClr val="tx1"/>
             </a:solidFill>
-            <a:ln>
-              <a:solidFill>
-                <a:schemeClr val="bg1"/>
-              </a:solidFill>
-            </a:ln>
-          </p:spPr>
-          <p:style>
-            <a:lnRef idx="2">
-              <a:schemeClr val="accent1">
-                <a:shade val="50000"/>
-              </a:schemeClr>
-            </a:lnRef>
-            <a:fillRef idx="1">
-              <a:schemeClr val="accent1"/>
-            </a:fillRef>
-            <a:effectRef idx="0">
-              <a:schemeClr val="accent1"/>
-            </a:effectRef>
-            <a:fontRef idx="minor">
-              <a:schemeClr val="lt1"/>
-            </a:fontRef>
-          </p:style>
-          <p:txBody>
-            <a:bodyPr rtlCol="0" anchor="ctr"/>
-            <a:lstStyle/>
-            <a:p>
-              <a:pPr algn="ctr"/>
-              <a:endParaRPr lang="en-US"/>
-            </a:p>
-          </p:txBody>
-        </p:sp>
-      </p:grpSp>
+          </a:ln>
+        </p:spPr>
+        <p:txBody>
+          <a:bodyPr wrap="square" rtlCol="0">
+            <a:spAutoFit/>
+          </a:bodyPr>
+          <a:lstStyle/>
+          <a:p>
+            <a:pPr marL="227013" indent="-227013">
+              <a:spcBef>
+                <a:spcPts val="300"/>
+              </a:spcBef>
+            </a:pPr>
+            <a:r>
+              <a:rPr lang="en-US" sz="1400" dirty="0">
+                <a:latin typeface="Times New Roman" panose="02020603050405020304" pitchFamily="18" charset="0"/>
+                <a:cs typeface="Times New Roman" panose="02020603050405020304" pitchFamily="18" charset="0"/>
+              </a:rPr>
+              <a:t>Docs for ‘git clone’,  </a:t>
+            </a:r>
+            <a:r>
+              <a:rPr lang="en-US" sz="1400" dirty="0">
+                <a:latin typeface="Times New Roman" panose="02020603050405020304" pitchFamily="18" charset="0"/>
+                <a:cs typeface="Times New Roman" panose="02020603050405020304" pitchFamily="18" charset="0"/>
+                <a:hlinkClick r:id="rId3"/>
+              </a:rPr>
+              <a:t>https://git-scm.com/docs/git-clone</a:t>
+            </a:r>
+            <a:r>
+              <a:rPr lang="en-US" sz="1400" dirty="0">
+                <a:latin typeface="Times New Roman" panose="02020603050405020304" pitchFamily="18" charset="0"/>
+                <a:cs typeface="Times New Roman" panose="02020603050405020304" pitchFamily="18" charset="0"/>
+              </a:rPr>
+              <a:t> </a:t>
+            </a:r>
+          </a:p>
+        </p:txBody>
+      </p:sp>
     </p:spTree>
     <p:extLst>
       <p:ext uri="{BB962C8B-B14F-4D97-AF65-F5344CB8AC3E}">
-        <p14:creationId xmlns:p14="http://schemas.microsoft.com/office/powerpoint/2010/main" val="1329373988"/>
+        <p14:creationId xmlns:p14="http://schemas.microsoft.com/office/powerpoint/2010/main" val="3868935857"/>
       </p:ext>
     </p:extLst>
   </p:cSld>
@@ -4798,51 +6052,384 @@
           <a:p>
             <a:r>
               <a:rPr lang="en-US" dirty="0"/>
-              <a:t>Class discussion:</a:t>
-            </a:r>
-          </a:p>
-        </p:txBody>
-      </p:sp>
-      <p:sp>
-        <p:nvSpPr>
-          <p:cNvPr id="6" name="Content Placeholder 2">
+              <a:t>git – Creating a Branch</a:t>
+            </a:r>
+            <a:endParaRPr lang="en-US" b="0" dirty="0"/>
+          </a:p>
+        </p:txBody>
+      </p:sp>
+      <p:sp>
+        <p:nvSpPr>
+          <p:cNvPr id="3" name="Content Placeholder 2"/>
+          <p:cNvSpPr>
+            <a:spLocks noGrp="1"/>
+          </p:cNvSpPr>
+          <p:nvPr>
+            <p:ph idx="1"/>
+          </p:nvPr>
+        </p:nvSpPr>
+        <p:spPr>
+          <a:xfrm>
+            <a:off x="276639" y="827314"/>
+            <a:ext cx="8608944" cy="5406337"/>
+          </a:xfrm>
+        </p:spPr>
+        <p:txBody>
+          <a:bodyPr>
+            <a:normAutofit fontScale="92500" lnSpcReduction="20000"/>
+          </a:bodyPr>
+          <a:lstStyle/>
+          <a:p>
+            <a:r>
+              <a:rPr lang="en-US" dirty="0"/>
+              <a:t>Branches provide a way to track different sets of changes on the same repo</a:t>
+            </a:r>
+          </a:p>
+          <a:p>
+            <a:pPr lvl="1"/>
+            <a:r>
+              <a:rPr lang="en-US" dirty="0"/>
+              <a:t>With no conflicts from concurrent modifications to the same part of the repo</a:t>
+            </a:r>
+          </a:p>
+          <a:p>
+            <a:pPr lvl="1"/>
+            <a:r>
+              <a:rPr lang="en-US" dirty="0"/>
+              <a:t>a branch is a ref, pointing to latest commit in a ‘branch’ of the commit tree</a:t>
+            </a:r>
+          </a:p>
+          <a:p>
+            <a:r>
+              <a:rPr lang="en-US" dirty="0"/>
+              <a:t>In our example repo (see figure on slide #6), we start with two branches</a:t>
+            </a:r>
+          </a:p>
+          <a:p>
+            <a:pPr lvl="1"/>
+            <a:r>
+              <a:rPr lang="en-US" dirty="0"/>
+              <a:t>my_branch  &amp;  master</a:t>
+            </a:r>
+          </a:p>
+          <a:p>
+            <a:pPr lvl="1"/>
+            <a:r>
+              <a:rPr lang="en-US" dirty="0"/>
+              <a:t>both initially point to the same address, </a:t>
+            </a:r>
+            <a:r>
+              <a:rPr lang="en-US" sz="1800" dirty="0">
+                <a:solidFill>
+                  <a:schemeClr val="tx1"/>
+                </a:solidFill>
+                <a:latin typeface="Courier New" panose="02070309020205020404" pitchFamily="49" charset="0"/>
+                <a:cs typeface="Courier New" panose="02070309020205020404" pitchFamily="49" charset="0"/>
+              </a:rPr>
+              <a:t>2d52a68</a:t>
+            </a:r>
+            <a:endParaRPr lang="en-US" dirty="0"/>
+          </a:p>
+          <a:p>
+            <a:pPr lvl="1"/>
+            <a:r>
+              <a:rPr lang="en-US" dirty="0"/>
+              <a:t>after changes in each branch occur separately, we see they have diverged</a:t>
+            </a:r>
+          </a:p>
+          <a:p>
+            <a:pPr lvl="2"/>
+            <a:r>
+              <a:rPr lang="en-US" dirty="0"/>
+              <a:t>addresses </a:t>
+            </a:r>
+            <a:r>
+              <a:rPr lang="en-US" sz="1600" b="0" dirty="0">
+                <a:solidFill>
+                  <a:schemeClr val="tx1"/>
+                </a:solidFill>
+                <a:latin typeface="Courier New" panose="02070309020205020404" pitchFamily="49" charset="0"/>
+                <a:cs typeface="Courier New" panose="02070309020205020404" pitchFamily="49" charset="0"/>
+              </a:rPr>
+              <a:t>243742d</a:t>
+            </a:r>
+            <a:r>
+              <a:rPr lang="en-US" dirty="0"/>
+              <a:t>  &amp;  </a:t>
+            </a:r>
+            <a:r>
+              <a:rPr lang="en-US" sz="1600" b="0" dirty="0">
+                <a:solidFill>
+                  <a:schemeClr val="tx1"/>
+                </a:solidFill>
+                <a:latin typeface="Courier New" panose="02070309020205020404" pitchFamily="49" charset="0"/>
+                <a:cs typeface="Courier New" panose="02070309020205020404" pitchFamily="49" charset="0"/>
+              </a:rPr>
+              <a:t>04d25ed</a:t>
+            </a:r>
+            <a:r>
+              <a:rPr lang="en-US" dirty="0"/>
+              <a:t> respectively.</a:t>
+            </a:r>
+          </a:p>
+          <a:p>
+            <a:r>
+              <a:rPr lang="en-US" dirty="0"/>
+              <a:t>Examples of using the ‘branch’ command:</a:t>
+            </a:r>
+          </a:p>
+          <a:p>
+            <a:pPr lvl="1"/>
+            <a:r>
+              <a:rPr lang="en-US" dirty="0"/>
+              <a:t>Create new branch  </a:t>
+            </a:r>
+            <a:r>
+              <a:rPr lang="en-US" sz="1800" dirty="0">
+                <a:solidFill>
+                  <a:schemeClr val="tx1"/>
+                </a:solidFill>
+                <a:latin typeface="Courier New" panose="02070309020205020404" pitchFamily="49" charset="0"/>
+                <a:cs typeface="Courier New" panose="02070309020205020404" pitchFamily="49" charset="0"/>
+              </a:rPr>
+              <a:t>branch_name</a:t>
+            </a:r>
+            <a:r>
+              <a:rPr lang="en-US" dirty="0"/>
+              <a:t>  pointing to same address as  </a:t>
+            </a:r>
+            <a:r>
+              <a:rPr lang="en-US" sz="1800" dirty="0">
+                <a:solidFill>
+                  <a:schemeClr val="tx1"/>
+                </a:solidFill>
+                <a:latin typeface="Courier New" panose="02070309020205020404" pitchFamily="49" charset="0"/>
+                <a:cs typeface="Courier New" panose="02070309020205020404" pitchFamily="49" charset="0"/>
+              </a:rPr>
+              <a:t>HEAD</a:t>
+            </a:r>
+            <a:endParaRPr lang="en-US" dirty="0">
+              <a:solidFill>
+                <a:schemeClr val="tx1"/>
+              </a:solidFill>
+              <a:latin typeface="Courier New" panose="02070309020205020404" pitchFamily="49" charset="0"/>
+              <a:cs typeface="Courier New" panose="02070309020205020404" pitchFamily="49" charset="0"/>
+            </a:endParaRPr>
+          </a:p>
+          <a:p>
+            <a:pPr marL="801688" indent="0">
+              <a:buNone/>
+            </a:pPr>
+            <a:r>
+              <a:rPr lang="en-US" sz="1600" dirty="0">
+                <a:latin typeface="Courier New" panose="02070309020205020404" pitchFamily="49" charset="0"/>
+                <a:cs typeface="Courier New" panose="02070309020205020404" pitchFamily="49" charset="0"/>
+              </a:rPr>
+              <a:t>$ git branch branch_name</a:t>
+            </a:r>
+          </a:p>
+          <a:p>
+            <a:pPr lvl="1"/>
+            <a:r>
+              <a:rPr lang="en-US" dirty="0"/>
+              <a:t>List local branches</a:t>
+            </a:r>
+          </a:p>
+          <a:p>
+            <a:pPr marL="801688" indent="0">
+              <a:buNone/>
+            </a:pPr>
+            <a:r>
+              <a:rPr lang="en-US" sz="1600" dirty="0">
+                <a:latin typeface="Courier New" panose="02070309020205020404" pitchFamily="49" charset="0"/>
+                <a:cs typeface="Courier New" panose="02070309020205020404" pitchFamily="49" charset="0"/>
+              </a:rPr>
+              <a:t>$ git branch</a:t>
+            </a:r>
+          </a:p>
+          <a:p>
+            <a:pPr lvl="1"/>
+            <a:r>
+              <a:rPr lang="en-US" dirty="0"/>
+              <a:t>List remote branches</a:t>
+            </a:r>
+          </a:p>
+          <a:p>
+            <a:pPr marL="801688" indent="0">
+              <a:buNone/>
+            </a:pPr>
+            <a:r>
+              <a:rPr lang="en-US" sz="1600" dirty="0">
+                <a:latin typeface="Courier New" panose="02070309020205020404" pitchFamily="49" charset="0"/>
+                <a:cs typeface="Courier New" panose="02070309020205020404" pitchFamily="49" charset="0"/>
+              </a:rPr>
+              <a:t>$ git branch -r</a:t>
+            </a:r>
+          </a:p>
+          <a:p>
+            <a:pPr lvl="1"/>
+            <a:r>
+              <a:rPr lang="en-US" dirty="0"/>
+              <a:t>Delete branch named 'branch_name'</a:t>
+            </a:r>
+          </a:p>
+          <a:p>
+            <a:pPr marL="801688" indent="0">
+              <a:buNone/>
+            </a:pPr>
+            <a:r>
+              <a:rPr lang="en-US" sz="1600" dirty="0">
+                <a:latin typeface="Courier New" panose="02070309020205020404" pitchFamily="49" charset="0"/>
+                <a:cs typeface="Courier New" panose="02070309020205020404" pitchFamily="49" charset="0"/>
+              </a:rPr>
+              <a:t>$ git branch -d branch_name</a:t>
+            </a:r>
+          </a:p>
+          <a:p>
+            <a:pPr lvl="1"/>
+            <a:r>
+              <a:rPr lang="en-US" dirty="0"/>
+              <a:t>Rename the branch  </a:t>
+            </a:r>
+            <a:r>
+              <a:rPr lang="en-US" dirty="0">
+                <a:solidFill>
+                  <a:schemeClr val="tx1"/>
+                </a:solidFill>
+                <a:latin typeface="Courier New" panose="02070309020205020404" pitchFamily="49" charset="0"/>
+                <a:cs typeface="Courier New" panose="02070309020205020404" pitchFamily="49" charset="0"/>
+              </a:rPr>
+              <a:t>branch_name</a:t>
+            </a:r>
+            <a:r>
+              <a:rPr lang="en-US" dirty="0"/>
+              <a:t>  to new name:  </a:t>
+            </a:r>
+            <a:r>
+              <a:rPr lang="en-US" dirty="0">
+                <a:solidFill>
+                  <a:schemeClr val="tx1"/>
+                </a:solidFill>
+                <a:latin typeface="Courier New" panose="02070309020205020404" pitchFamily="49" charset="0"/>
+                <a:cs typeface="Courier New" panose="02070309020205020404" pitchFamily="49" charset="0"/>
+              </a:rPr>
+              <a:t>new_branch_name</a:t>
+            </a:r>
+          </a:p>
+          <a:p>
+            <a:pPr marL="801688" indent="0">
+              <a:buNone/>
+            </a:pPr>
+            <a:r>
+              <a:rPr lang="en-US" sz="1600" dirty="0">
+                <a:latin typeface="Courier New" panose="02070309020205020404" pitchFamily="49" charset="0"/>
+                <a:cs typeface="Courier New" panose="02070309020205020404" pitchFamily="49" charset="0"/>
+              </a:rPr>
+              <a:t>$ git branch -m branch_name new_branch_name</a:t>
+            </a:r>
+          </a:p>
+          <a:p>
+            <a:pPr lvl="1"/>
+            <a:r>
+              <a:rPr lang="en-US" dirty="0"/>
+              <a:t>Make current branch track  </a:t>
+            </a:r>
+            <a:r>
+              <a:rPr lang="en-US" dirty="0">
+                <a:solidFill>
+                  <a:schemeClr val="tx1"/>
+                </a:solidFill>
+                <a:latin typeface="Courier New" panose="02070309020205020404" pitchFamily="49" charset="0"/>
+                <a:cs typeface="Courier New" panose="02070309020205020404" pitchFamily="49" charset="0"/>
+              </a:rPr>
+              <a:t>branch_name</a:t>
+            </a:r>
+            <a:r>
+              <a:rPr lang="en-US" dirty="0"/>
+              <a:t>  within remote repo “radiasoft”</a:t>
+            </a:r>
+          </a:p>
+          <a:p>
+            <a:pPr marL="801688" indent="0">
+              <a:buNone/>
+            </a:pPr>
+            <a:r>
+              <a:rPr lang="en-US" sz="1600" dirty="0">
+                <a:latin typeface="Courier New" panose="02070309020205020404" pitchFamily="49" charset="0"/>
+                <a:cs typeface="Courier New" panose="02070309020205020404" pitchFamily="49" charset="0"/>
+              </a:rPr>
+              <a:t>$ git branch -u radiasoft branch_name</a:t>
+            </a:r>
+          </a:p>
+        </p:txBody>
+      </p:sp>
+      <p:sp>
+        <p:nvSpPr>
+          <p:cNvPr id="4" name="TextBox 3">
             <a:extLst>
               <a:ext uri="{FF2B5EF4-FFF2-40B4-BE49-F238E27FC236}">
-                <a16:creationId xmlns:a16="http://schemas.microsoft.com/office/drawing/2014/main" id="{9081FF26-7AD5-4767-AF65-A27F1769E1FC}"/>
+                <a16:creationId xmlns:a16="http://schemas.microsoft.com/office/drawing/2014/main" id="{B601D247-3D75-4D67-842C-20FDCCCA9524}"/>
               </a:ext>
             </a:extLst>
           </p:cNvPr>
-          <p:cNvSpPr>
-            <a:spLocks noGrp="1"/>
-          </p:cNvSpPr>
-          <p:nvPr>
-            <p:ph idx="1"/>
-          </p:nvPr>
+          <p:cNvSpPr txBox="1"/>
+          <p:nvPr/>
         </p:nvSpPr>
         <p:spPr>
           <a:xfrm>
-            <a:off x="152400" y="827314"/>
-            <a:ext cx="8839200" cy="5146766"/>
+            <a:off x="4380410" y="5876797"/>
+            <a:ext cx="4336869" cy="307777"/>
           </a:xfrm>
+          <a:prstGeom prst="rect">
+            <a:avLst/>
+          </a:prstGeom>
+          <a:noFill/>
+          <a:ln>
+            <a:solidFill>
+              <a:schemeClr val="tx1"/>
+            </a:solidFill>
+          </a:ln>
         </p:spPr>
         <p:txBody>
-          <a:bodyPr>
-            <a:normAutofit/>
+          <a:bodyPr wrap="square" rtlCol="0">
+            <a:spAutoFit/>
           </a:bodyPr>
           <a:lstStyle/>
           <a:p>
-            <a:r>
-              <a:rPr lang="en-US" sz="1800" i="0" dirty="0"/>
-              <a:t>TBD…</a:t>
-            </a:r>
-            <a:endParaRPr lang="en-US" i="0" dirty="0"/>
+            <a:pPr marL="227013" indent="-227013">
+              <a:spcBef>
+                <a:spcPts val="300"/>
+              </a:spcBef>
+            </a:pPr>
+            <a:r>
+              <a:rPr lang="en-US" sz="1400" dirty="0">
+                <a:latin typeface="Times New Roman" panose="02020603050405020304" pitchFamily="18" charset="0"/>
+                <a:cs typeface="Times New Roman" panose="02020603050405020304" pitchFamily="18" charset="0"/>
+              </a:rPr>
+              <a:t>Docs for ‘git branch’, </a:t>
+            </a:r>
+            <a:r>
+              <a:rPr lang="en-US" sz="1400" dirty="0">
+                <a:latin typeface="Times New Roman" panose="02020603050405020304" pitchFamily="18" charset="0"/>
+                <a:cs typeface="Times New Roman" panose="02020603050405020304" pitchFamily="18" charset="0"/>
+                <a:hlinkClick r:id="rId3"/>
+              </a:rPr>
+              <a:t>https://git-scm.com/docs/git-branch</a:t>
+            </a:r>
+            <a:r>
+              <a:rPr lang="en-US" sz="1400" dirty="0">
+                <a:latin typeface="Times New Roman" panose="02020603050405020304" pitchFamily="18" charset="0"/>
+                <a:cs typeface="Times New Roman" panose="02020603050405020304" pitchFamily="18" charset="0"/>
+              </a:rPr>
+              <a:t> </a:t>
+            </a:r>
           </a:p>
         </p:txBody>
       </p:sp>
     </p:spTree>
     <p:extLst>
       <p:ext uri="{BB962C8B-B14F-4D97-AF65-F5344CB8AC3E}">
-        <p14:creationId xmlns:p14="http://schemas.microsoft.com/office/powerpoint/2010/main" val="2046148354"/>
+        <p14:creationId xmlns:p14="http://schemas.microsoft.com/office/powerpoint/2010/main" val="650932450"/>
       </p:ext>
     </p:extLst>
   </p:cSld>
@@ -4881,7 +6468,7 @@
         </p:nvSpPr>
         <p:spPr>
           <a:xfrm>
-            <a:off x="0" y="70385"/>
+            <a:off x="0" y="140672"/>
             <a:ext cx="9144000" cy="589085"/>
           </a:xfrm>
         </p:spPr>
@@ -4893,8 +6480,9 @@
           <a:p>
             <a:r>
               <a:rPr lang="en-US" dirty="0"/>
-              <a:t>Wrap up</a:t>
-            </a:r>
+              <a:t>git – the Checkout command</a:t>
+            </a:r>
+            <a:endParaRPr lang="en-US" b="0" dirty="0"/>
           </a:p>
         </p:txBody>
       </p:sp>
@@ -4910,8 +6498,8 @@
         </p:nvSpPr>
         <p:spPr>
           <a:xfrm>
-            <a:off x="152400" y="862150"/>
-            <a:ext cx="8839200" cy="5441932"/>
+            <a:off x="276639" y="729758"/>
+            <a:ext cx="8608944" cy="5503894"/>
           </a:xfrm>
         </p:spPr>
         <p:txBody>
@@ -4922,33 +6510,320 @@
           <a:p>
             <a:r>
               <a:rPr lang="en-US" dirty="0"/>
-              <a:t>TBD…</a:t>
-            </a:r>
-          </a:p>
-          <a:p>
-            <a:pPr lvl="1"/>
+              <a:t>It changes the </a:t>
+            </a:r>
+            <a:r>
+              <a:rPr lang="en-US" dirty="0">
+                <a:latin typeface="Courier New" panose="02070309020205020404" pitchFamily="49" charset="0"/>
+                <a:cs typeface="Courier New" panose="02070309020205020404" pitchFamily="49" charset="0"/>
+              </a:rPr>
+              <a:t>HEAD</a:t>
+            </a:r>
+            <a:r>
+              <a:rPr lang="en-US" dirty="0"/>
+              <a:t> reference, so it points to a new address</a:t>
+            </a:r>
+          </a:p>
+          <a:p>
+            <a:pPr lvl="1"/>
+            <a:r>
+              <a:rPr lang="en-US" dirty="0"/>
+              <a:t>affects only the working directory</a:t>
+            </a:r>
+          </a:p>
+          <a:p>
+            <a:pPr lvl="1"/>
+            <a:r>
+              <a:rPr lang="en-US" dirty="0"/>
+              <a:t>secondary use:  undo changes in the working directory</a:t>
+            </a:r>
+          </a:p>
+          <a:p>
+            <a:pPr marL="801688" indent="0">
+              <a:buNone/>
+            </a:pPr>
+            <a:r>
+              <a:rPr lang="en-US" sz="1600" dirty="0">
+                <a:latin typeface="Courier New" panose="02070309020205020404" pitchFamily="49" charset="0"/>
+                <a:cs typeface="Courier New" panose="02070309020205020404" pitchFamily="49" charset="0"/>
+              </a:rPr>
+              <a:t>$ git checkout [&lt;options&gt;] &lt;branch&gt;</a:t>
+            </a:r>
+          </a:p>
+          <a:p>
+            <a:pPr lvl="2"/>
             <a:endParaRPr lang="en-US" dirty="0"/>
           </a:p>
           <a:p>
             <a:r>
               <a:rPr lang="en-US" dirty="0"/>
-              <a:t>Any final questions regarding the material in this lecture?</a:t>
-            </a:r>
-          </a:p>
-          <a:p>
+              <a:t>Useful examples:</a:t>
+            </a:r>
+          </a:p>
+          <a:p>
+            <a:pPr lvl="1"/>
+            <a:r>
+              <a:rPr lang="en-US" dirty="0"/>
+              <a:t>get latest commit from the  </a:t>
+            </a:r>
+            <a:r>
+              <a:rPr lang="en-US" sz="1800" dirty="0">
+                <a:solidFill>
+                  <a:schemeClr val="tx1"/>
+                </a:solidFill>
+                <a:latin typeface="Courier New" panose="02070309020205020404" pitchFamily="49" charset="0"/>
+                <a:cs typeface="Courier New" panose="02070309020205020404" pitchFamily="49" charset="0"/>
+              </a:rPr>
+              <a:t>master</a:t>
+            </a:r>
+            <a:r>
+              <a:rPr lang="en-US" dirty="0"/>
+              <a:t>  branch for use in currently active branch</a:t>
+            </a:r>
+          </a:p>
+          <a:p>
+            <a:pPr marL="801688" indent="0">
+              <a:buNone/>
+            </a:pPr>
+            <a:r>
+              <a:rPr lang="en-US" sz="1600" dirty="0">
+                <a:latin typeface="Courier New" panose="02070309020205020404" pitchFamily="49" charset="0"/>
+                <a:cs typeface="Courier New" panose="02070309020205020404" pitchFamily="49" charset="0"/>
+              </a:rPr>
+              <a:t>$ git checkout master</a:t>
+            </a:r>
+          </a:p>
+          <a:p>
+            <a:pPr lvl="1"/>
+            <a:r>
+              <a:rPr lang="en-US" dirty="0"/>
+              <a:t>get an address (e.g. </a:t>
+            </a:r>
+            <a:r>
+              <a:rPr lang="en-US" dirty="0">
+                <a:solidFill>
+                  <a:srgbClr val="000000"/>
+                </a:solidFill>
+                <a:latin typeface="Courier New" panose="02070309020205020404" pitchFamily="49" charset="0"/>
+              </a:rPr>
+              <a:t>2d52a68</a:t>
+            </a:r>
+            <a:r>
+              <a:rPr lang="en-US" dirty="0"/>
+              <a:t>) and label it as branch  </a:t>
+            </a:r>
+            <a:r>
+              <a:rPr lang="en-US" sz="1800" dirty="0">
+                <a:solidFill>
+                  <a:schemeClr val="tx1"/>
+                </a:solidFill>
+                <a:latin typeface="Courier New" panose="02070309020205020404" pitchFamily="49" charset="0"/>
+                <a:cs typeface="Courier New" panose="02070309020205020404" pitchFamily="49" charset="0"/>
+              </a:rPr>
+              <a:t>new_branch_name</a:t>
+            </a:r>
+            <a:endParaRPr lang="en-US" dirty="0">
+              <a:solidFill>
+                <a:schemeClr val="tx1"/>
+              </a:solidFill>
+              <a:latin typeface="Courier New" panose="02070309020205020404" pitchFamily="49" charset="0"/>
+              <a:cs typeface="Courier New" panose="02070309020205020404" pitchFamily="49" charset="0"/>
+            </a:endParaRPr>
+          </a:p>
+          <a:p>
+            <a:pPr marL="801688" indent="0">
+              <a:buNone/>
+            </a:pPr>
+            <a:r>
+              <a:rPr lang="en-US" sz="1600" dirty="0">
+                <a:latin typeface="Courier New" panose="02070309020205020404" pitchFamily="49" charset="0"/>
+                <a:cs typeface="Courier New" panose="02070309020205020404" pitchFamily="49" charset="0"/>
+              </a:rPr>
+              <a:t>$ git checkout -b new_branch_name 2d52a68</a:t>
+            </a:r>
+          </a:p>
+          <a:p>
+            <a:pPr lvl="1"/>
+            <a:r>
+              <a:rPr lang="en-US" dirty="0"/>
+              <a:t>force a checkout from </a:t>
+            </a:r>
+            <a:r>
+              <a:rPr lang="en-US" dirty="0">
+                <a:solidFill>
+                  <a:schemeClr val="tx1"/>
+                </a:solidFill>
+                <a:latin typeface="Courier New" panose="02070309020205020404" pitchFamily="49" charset="0"/>
+                <a:cs typeface="Courier New" panose="02070309020205020404" pitchFamily="49" charset="0"/>
+              </a:rPr>
+              <a:t>master</a:t>
+            </a:r>
+            <a:r>
+              <a:rPr lang="en-US" dirty="0"/>
+              <a:t>  branch, throwing away local modifications</a:t>
+            </a:r>
+          </a:p>
+          <a:p>
+            <a:pPr marL="801688" indent="0">
+              <a:buNone/>
+            </a:pPr>
+            <a:r>
+              <a:rPr lang="en-US" sz="1600" dirty="0">
+                <a:latin typeface="Courier New" panose="02070309020205020404" pitchFamily="49" charset="0"/>
+                <a:cs typeface="Courier New" panose="02070309020205020404" pitchFamily="49" charset="0"/>
+              </a:rPr>
+              <a:t>$ git checkout -f master</a:t>
+            </a:r>
+          </a:p>
+          <a:p>
+            <a:pPr lvl="1"/>
+            <a:r>
+              <a:rPr lang="en-US" dirty="0"/>
+              <a:t>revert changes in file  </a:t>
+            </a:r>
+            <a:r>
+              <a:rPr lang="en-US" dirty="0">
+                <a:solidFill>
+                  <a:schemeClr val="tx1"/>
+                </a:solidFill>
+                <a:latin typeface="Courier New" panose="02070309020205020404" pitchFamily="49" charset="0"/>
+                <a:cs typeface="Courier New" panose="02070309020205020404" pitchFamily="49" charset="0"/>
+              </a:rPr>
+              <a:t>my_file.py</a:t>
+            </a:r>
+            <a:r>
+              <a:rPr lang="en-US" dirty="0"/>
+              <a:t> </a:t>
+            </a:r>
+            <a:endParaRPr lang="en-US" dirty="0">
+              <a:solidFill>
+                <a:schemeClr val="tx1"/>
+              </a:solidFill>
+              <a:latin typeface="Courier New" panose="02070309020205020404" pitchFamily="49" charset="0"/>
+              <a:cs typeface="Courier New" panose="02070309020205020404" pitchFamily="49" charset="0"/>
+            </a:endParaRPr>
+          </a:p>
+          <a:p>
+            <a:pPr marL="801688" indent="0">
+              <a:buNone/>
+            </a:pPr>
+            <a:r>
+              <a:rPr lang="en-US" sz="1600" dirty="0">
+                <a:latin typeface="Courier New" panose="02070309020205020404" pitchFamily="49" charset="0"/>
+                <a:cs typeface="Courier New" panose="02070309020205020404" pitchFamily="49" charset="0"/>
+              </a:rPr>
+              <a:t>$ git checkout path/to/my_file.py</a:t>
+            </a:r>
+          </a:p>
+          <a:p>
+            <a:pPr lvl="1"/>
+            <a:r>
+              <a:rPr lang="en-US" dirty="0"/>
+              <a:t>revert file </a:t>
+            </a:r>
+            <a:r>
+              <a:rPr lang="en-US" dirty="0">
+                <a:solidFill>
+                  <a:schemeClr val="tx1"/>
+                </a:solidFill>
+                <a:latin typeface="Courier New" panose="02070309020205020404" pitchFamily="49" charset="0"/>
+                <a:cs typeface="Courier New" panose="02070309020205020404" pitchFamily="49" charset="0"/>
+              </a:rPr>
+              <a:t>my_file.py</a:t>
+            </a:r>
+            <a:r>
+              <a:rPr lang="en-US" dirty="0"/>
+              <a:t>  to its state in the branch  </a:t>
+            </a:r>
+            <a:r>
+              <a:rPr lang="en-US" dirty="0">
+                <a:solidFill>
+                  <a:schemeClr val="tx1"/>
+                </a:solidFill>
+                <a:latin typeface="Courier New" panose="02070309020205020404" pitchFamily="49" charset="0"/>
+                <a:cs typeface="Courier New" panose="02070309020205020404" pitchFamily="49" charset="0"/>
+              </a:rPr>
+              <a:t>my_branch</a:t>
+            </a:r>
             <a:endParaRPr lang="en-US" dirty="0"/>
           </a:p>
           <a:p>
-            <a:r>
-              <a:rPr lang="en-US" dirty="0"/>
-              <a:t>Computer Lab this afternoon – </a:t>
-            </a:r>
-          </a:p>
-          <a:p>
-            <a:pPr lvl="1"/>
-            <a:r>
-              <a:rPr lang="en-US" dirty="0"/>
-              <a:t>TBD…</a:t>
+            <a:pPr marL="801688" indent="0">
+              <a:buNone/>
+            </a:pPr>
+            <a:r>
+              <a:rPr lang="en-US" sz="1600" dirty="0">
+                <a:latin typeface="Courier New" panose="02070309020205020404" pitchFamily="49" charset="0"/>
+                <a:cs typeface="Courier New" panose="02070309020205020404" pitchFamily="49" charset="0"/>
+              </a:rPr>
+              <a:t>$ git checkout my_branch -- path/to/my_file.py</a:t>
+            </a:r>
+            <a:endParaRPr lang="en-US" dirty="0">
+              <a:latin typeface="Courier New" panose="02070309020205020404" pitchFamily="49" charset="0"/>
+              <a:cs typeface="Courier New" panose="02070309020205020404" pitchFamily="49" charset="0"/>
+            </a:endParaRPr>
+          </a:p>
+        </p:txBody>
+      </p:sp>
+      <p:sp>
+        <p:nvSpPr>
+          <p:cNvPr id="4" name="TextBox 3">
+            <a:extLst>
+              <a:ext uri="{FF2B5EF4-FFF2-40B4-BE49-F238E27FC236}">
+                <a16:creationId xmlns:a16="http://schemas.microsoft.com/office/drawing/2014/main" id="{B601D247-3D75-4D67-842C-20FDCCCA9524}"/>
+              </a:ext>
+            </a:extLst>
+          </p:cNvPr>
+          <p:cNvSpPr txBox="1"/>
+          <p:nvPr/>
+        </p:nvSpPr>
+        <p:spPr>
+          <a:xfrm>
+            <a:off x="3979818" y="6030685"/>
+            <a:ext cx="4737462" cy="307777"/>
+          </a:xfrm>
+          <a:prstGeom prst="rect">
+            <a:avLst/>
+          </a:prstGeom>
+          <a:noFill/>
+          <a:ln>
+            <a:solidFill>
+              <a:schemeClr val="tx1"/>
+            </a:solidFill>
+          </a:ln>
+        </p:spPr>
+        <p:txBody>
+          <a:bodyPr wrap="square" rtlCol="0">
+            <a:spAutoFit/>
+          </a:bodyPr>
+          <a:lstStyle/>
+          <a:p>
+            <a:pPr marL="227013" indent="-227013">
+              <a:spcBef>
+                <a:spcPts val="300"/>
+              </a:spcBef>
+            </a:pPr>
+            <a:r>
+              <a:rPr lang="en-US" sz="1400" dirty="0">
+                <a:latin typeface="Times New Roman" panose="02020603050405020304" pitchFamily="18" charset="0"/>
+                <a:cs typeface="Times New Roman" panose="02020603050405020304" pitchFamily="18" charset="0"/>
+              </a:rPr>
+              <a:t>Docs for ‘git checkout’, </a:t>
+            </a:r>
+            <a:r>
+              <a:rPr lang="en-US" sz="1400" dirty="0">
+                <a:latin typeface="Times New Roman" panose="02020603050405020304" pitchFamily="18" charset="0"/>
+                <a:cs typeface="Times New Roman" panose="02020603050405020304" pitchFamily="18" charset="0"/>
+                <a:hlinkClick r:id="rId3"/>
+              </a:rPr>
+              <a:t>https://git-scm.com/docs/git-checkout</a:t>
+            </a:r>
+            <a:r>
+              <a:rPr lang="en-US" sz="1400" dirty="0">
+                <a:latin typeface="Times New Roman" panose="02020603050405020304" pitchFamily="18" charset="0"/>
+                <a:cs typeface="Times New Roman" panose="02020603050405020304" pitchFamily="18" charset="0"/>
+              </a:rPr>
+              <a:t>  </a:t>
             </a:r>
           </a:p>
         </p:txBody>
@@ -4956,7 +6831,7 @@
     </p:spTree>
     <p:extLst>
       <p:ext uri="{BB962C8B-B14F-4D97-AF65-F5344CB8AC3E}">
-        <p14:creationId xmlns:p14="http://schemas.microsoft.com/office/powerpoint/2010/main" val="12542219"/>
+        <p14:creationId xmlns:p14="http://schemas.microsoft.com/office/powerpoint/2010/main" val="2052266732"/>
       </p:ext>
     </p:extLst>
   </p:cSld>

</xml_diff>